<commit_message>
timings plust post run tweaks
</commit_message>
<xml_diff>
--- a/instructors/04-Public_repositories.pptx
+++ b/instructors/04-Public_repositories.pptx
@@ -221,7 +221,7 @@
           <a:p>
             <a:fld id="{585C48AE-4A1E-9A43-835F-510354165F99}" type="datetimeFigureOut">
               <a:rPr lang="en-GB" smtClean="0"/>
-              <a:t>22/07/2022</a:t>
+              <a:t>23/07/2022</a:t>
             </a:fld>
             <a:endParaRPr lang="en-GB" dirty="0"/>
           </a:p>
@@ -895,7 +895,7 @@
           <a:p>
             <a:fld id="{5913FB77-D8DB-4AB9-8EA5-EE8C3B57A5E1}" type="datetimeFigureOut">
               <a:rPr lang="en-GB" smtClean="0"/>
-              <a:t>22/07/2022</a:t>
+              <a:t>23/07/2022</a:t>
             </a:fld>
             <a:endParaRPr lang="en-GB" dirty="0"/>
           </a:p>
@@ -1142,7 +1142,7 @@
           <a:p>
             <a:fld id="{5913FB77-D8DB-4AB9-8EA5-EE8C3B57A5E1}" type="datetimeFigureOut">
               <a:rPr lang="en-GB" smtClean="0"/>
-              <a:t>22/07/2022</a:t>
+              <a:t>23/07/2022</a:t>
             </a:fld>
             <a:endParaRPr lang="en-GB" dirty="0"/>
           </a:p>
@@ -1352,7 +1352,7 @@
           <a:p>
             <a:fld id="{5913FB77-D8DB-4AB9-8EA5-EE8C3B57A5E1}" type="datetimeFigureOut">
               <a:rPr lang="en-GB" smtClean="0"/>
-              <a:t>22/07/2022</a:t>
+              <a:t>23/07/2022</a:t>
             </a:fld>
             <a:endParaRPr lang="en-GB" dirty="0"/>
           </a:p>
@@ -1552,7 +1552,7 @@
           <a:p>
             <a:fld id="{5913FB77-D8DB-4AB9-8EA5-EE8C3B57A5E1}" type="datetimeFigureOut">
               <a:rPr lang="en-GB" smtClean="0"/>
-              <a:t>22/07/2022</a:t>
+              <a:t>23/07/2022</a:t>
             </a:fld>
             <a:endParaRPr lang="en-GB" dirty="0"/>
           </a:p>
@@ -1828,7 +1828,7 @@
           <a:p>
             <a:fld id="{5913FB77-D8DB-4AB9-8EA5-EE8C3B57A5E1}" type="datetimeFigureOut">
               <a:rPr lang="en-GB" smtClean="0"/>
-              <a:t>22/07/2022</a:t>
+              <a:t>23/07/2022</a:t>
             </a:fld>
             <a:endParaRPr lang="en-GB" dirty="0"/>
           </a:p>
@@ -2096,7 +2096,7 @@
           <a:p>
             <a:fld id="{5913FB77-D8DB-4AB9-8EA5-EE8C3B57A5E1}" type="datetimeFigureOut">
               <a:rPr lang="en-GB" smtClean="0"/>
-              <a:t>22/07/2022</a:t>
+              <a:t>23/07/2022</a:t>
             </a:fld>
             <a:endParaRPr lang="en-GB" dirty="0"/>
           </a:p>
@@ -2511,7 +2511,7 @@
           <a:p>
             <a:fld id="{5913FB77-D8DB-4AB9-8EA5-EE8C3B57A5E1}" type="datetimeFigureOut">
               <a:rPr lang="en-GB" smtClean="0"/>
-              <a:t>22/07/2022</a:t>
+              <a:t>23/07/2022</a:t>
             </a:fld>
             <a:endParaRPr lang="en-GB" dirty="0"/>
           </a:p>
@@ -2653,7 +2653,7 @@
           <a:p>
             <a:fld id="{5913FB77-D8DB-4AB9-8EA5-EE8C3B57A5E1}" type="datetimeFigureOut">
               <a:rPr lang="en-GB" smtClean="0"/>
-              <a:t>22/07/2022</a:t>
+              <a:t>23/07/2022</a:t>
             </a:fld>
             <a:endParaRPr lang="en-GB" dirty="0"/>
           </a:p>
@@ -2766,7 +2766,7 @@
           <a:p>
             <a:fld id="{5913FB77-D8DB-4AB9-8EA5-EE8C3B57A5E1}" type="datetimeFigureOut">
               <a:rPr lang="en-GB" smtClean="0"/>
-              <a:t>22/07/2022</a:t>
+              <a:t>23/07/2022</a:t>
             </a:fld>
             <a:endParaRPr lang="en-GB" dirty="0"/>
           </a:p>
@@ -3079,7 +3079,7 @@
           <a:p>
             <a:fld id="{5913FB77-D8DB-4AB9-8EA5-EE8C3B57A5E1}" type="datetimeFigureOut">
               <a:rPr lang="en-GB" smtClean="0"/>
-              <a:t>22/07/2022</a:t>
+              <a:t>23/07/2022</a:t>
             </a:fld>
             <a:endParaRPr lang="en-GB" dirty="0"/>
           </a:p>
@@ -3368,7 +3368,7 @@
           <a:p>
             <a:fld id="{5913FB77-D8DB-4AB9-8EA5-EE8C3B57A5E1}" type="datetimeFigureOut">
               <a:rPr lang="en-GB" smtClean="0"/>
-              <a:t>22/07/2022</a:t>
+              <a:t>23/07/2022</a:t>
             </a:fld>
             <a:endParaRPr lang="en-GB" dirty="0"/>
           </a:p>
@@ -3610,7 +3610,7 @@
             <a:fld id="{5913FB77-D8DB-4AB9-8EA5-EE8C3B57A5E1}" type="datetimeFigureOut">
               <a:rPr lang="en-GB" smtClean="0"/>
               <a:pPr/>
-              <a:t>22/07/2022</a:t>
+              <a:t>23/07/2022</a:t>
             </a:fld>
             <a:endParaRPr lang="en-GB" dirty="0"/>
           </a:p>
@@ -5662,12 +5662,9 @@
           <a:p>
             <a:r>
               <a:rPr lang="pl-PL" dirty="0"/>
-              <a:t>Dataset discovery</a:t>
-            </a:r>
-            <a:r>
-              <a:rPr lang="en-GB" dirty="0"/>
-              <a:t> - Solution</a:t>
-            </a:r>
+              <a:t>Domain specific repositories</a:t>
+            </a:r>
+            <a:endParaRPr lang="en-GB" dirty="0"/>
           </a:p>
         </p:txBody>
       </p:sp>
@@ -5914,23 +5911,7 @@
                   <a:srgbClr val="0070C0"/>
                 </a:solidFill>
               </a:rPr>
-              <a:t>[</a:t>
-            </a:r>
-            <a:r>
-              <a:rPr lang="en-GB" sz="2000" dirty="0">
-                <a:solidFill>
-                  <a:srgbClr val="0070C0"/>
-                </a:solidFill>
-              </a:rPr>
-              <a:t>eLife</a:t>
-            </a:r>
-            <a:r>
-              <a:rPr lang="en-GB" sz="2000" dirty="0">
-                <a:solidFill>
-                  <a:srgbClr val="0070C0"/>
-                </a:solidFill>
-              </a:rPr>
-              <a:t>] - (https://submit.elifesciences.org/html/elife_author_instructions.html#policies)</a:t>
+              <a:t>[eLife] - (https://submit.elifesciences.org/html/elife_author_instructions.html#policies)</a:t>
             </a:r>
           </a:p>
           <a:p>
@@ -5986,23 +5967,7 @@
                   <a:srgbClr val="0070C0"/>
                 </a:solidFill>
               </a:rPr>
-              <a:t>[</a:t>
-            </a:r>
-            <a:r>
-              <a:rPr lang="en-GB" sz="2000" dirty="0">
-                <a:solidFill>
-                  <a:srgbClr val="0070C0"/>
-                </a:solidFill>
-              </a:rPr>
-              <a:t>GIGAscience</a:t>
-            </a:r>
-            <a:r>
-              <a:rPr lang="en-GB" sz="2000" dirty="0">
-                <a:solidFill>
-                  <a:srgbClr val="0070C0"/>
-                </a:solidFill>
-              </a:rPr>
-              <a:t> - OUP] - (https://academic.oup.com/gigascience/pages/instructions_to_authors)</a:t>
+              <a:t>[GIGAscience - OUP] - (https://academic.oup.com/gigascience/pages/instructions_to_authors)</a:t>
             </a:r>
           </a:p>
           <a:p>
@@ -6016,23 +5981,7 @@
                   <a:srgbClr val="0070C0"/>
                 </a:solidFill>
               </a:rPr>
-              <a:t>[</a:t>
-            </a:r>
-            <a:r>
-              <a:rPr lang="en-GB" sz="2000" dirty="0">
-                <a:solidFill>
-                  <a:srgbClr val="0070C0"/>
-                </a:solidFill>
-              </a:rPr>
-              <a:t>PLoS</a:t>
-            </a:r>
-            <a:r>
-              <a:rPr lang="en-GB" sz="2000" dirty="0">
-                <a:solidFill>
-                  <a:srgbClr val="0070C0"/>
-                </a:solidFill>
-              </a:rPr>
-              <a:t>] - (https://journals.plos.org/plosbiology/s/recommended-repositories)</a:t>
+              <a:t>[PLoS] - (https://journals.plos.org/plosbiology/s/recommended-repositories)</a:t>
             </a:r>
           </a:p>
           <a:p>
@@ -6746,27 +6695,7 @@
                 <a:effectLst/>
                 <a:latin typeface="Ubuntu"/>
               </a:rPr>
-              <a:t>GEO/SRA and ENA/</a:t>
-            </a:r>
-            <a:r>
-              <a:rPr lang="en-GB" sz="2000" b="0" i="0" dirty="0">
-                <a:solidFill>
-                  <a:srgbClr val="333333"/>
-                </a:solidFill>
-                <a:effectLst/>
-                <a:latin typeface="Ubuntu"/>
-              </a:rPr>
-              <a:t>ArrayExpress</a:t>
-            </a:r>
-            <a:r>
-              <a:rPr lang="en-GB" sz="2000" b="0" i="0" dirty="0">
-                <a:solidFill>
-                  <a:srgbClr val="333333"/>
-                </a:solidFill>
-                <a:effectLst/>
-                <a:latin typeface="Ubuntu"/>
-              </a:rPr>
-              <a:t> are good examples. Interestingly these repositories do not issue a DOI.</a:t>
+              <a:t>GEO/SRA and ENA/ArrayExpress are good examples. Interestingly these repositories do not issue a DOI.</a:t>
             </a:r>
           </a:p>
         </p:txBody>
@@ -7774,7 +7703,7 @@
         <p:spPr>
           <a:xfrm>
             <a:off x="730192" y="1690688"/>
-            <a:ext cx="10981854" cy="3970318"/>
+            <a:ext cx="10981854" cy="3416320"/>
           </a:xfrm>
           <a:prstGeom prst="rect">
             <a:avLst/>
@@ -7799,23 +7728,7 @@
                   <a:srgbClr val="0070C0"/>
                 </a:solidFill>
               </a:rPr>
-              <a:t>Find suitable repository(</a:t>
-            </a:r>
-            <a:r>
-              <a:rPr lang="en-GB" sz="2400" dirty="0">
-                <a:solidFill>
-                  <a:srgbClr val="0070C0"/>
-                </a:solidFill>
-              </a:rPr>
-              <a:t>ies</a:t>
-            </a:r>
-            <a:r>
-              <a:rPr lang="en-GB" sz="2400" dirty="0">
-                <a:solidFill>
-                  <a:srgbClr val="0070C0"/>
-                </a:solidFill>
-              </a:rPr>
-              <a:t>) as soon as </a:t>
+              <a:t>Find suitable repository(ies) as soon as </a:t>
             </a:r>
             <a:r>
               <a:rPr lang="en-GB" sz="2400" dirty="0" smtClean="0">
@@ -8004,52 +7917,6 @@
                 </a:solidFill>
               </a:rPr>
               <a:t>’ records </a:t>
-            </a:r>
-            <a:endParaRPr lang="pl-PL" sz="2400" dirty="0">
-              <a:solidFill>
-                <a:srgbClr val="0070C0"/>
-              </a:solidFill>
-            </a:endParaRPr>
-          </a:p>
-          <a:p>
-            <a:pPr marL="285750" indent="-285750">
-              <a:lnSpc>
-                <a:spcPct val="150000"/>
-              </a:lnSpc>
-              <a:buFont typeface="Arial" panose="020B0604020202020204" pitchFamily="34" charset="0"/>
-              <a:buChar char="•"/>
-            </a:pPr>
-            <a:r>
-              <a:rPr lang="en-GB" sz="2400" dirty="0">
-                <a:solidFill>
-                  <a:srgbClr val="0070C0"/>
-                </a:solidFill>
-              </a:rPr>
-              <a:t>Add data availability</a:t>
-            </a:r>
-            <a:r>
-              <a:rPr lang="pl-PL" sz="2400" dirty="0">
-                <a:solidFill>
-                  <a:srgbClr val="0070C0"/>
-                </a:solidFill>
-              </a:rPr>
-              <a:t> section to your papers and list all the public </a:t>
-            </a:r>
-            <a:r>
-              <a:rPr lang="en-GB" sz="2400" dirty="0" smtClean="0">
-                <a:solidFill>
-                  <a:srgbClr val="0070C0"/>
-                </a:solidFill>
-              </a:rPr>
-              <a:t>r</a:t>
-            </a:r>
-            <a:r>
-              <a:rPr lang="pl-PL" sz="2400" dirty="0" smtClean="0">
-                <a:solidFill>
-                  <a:srgbClr val="0070C0"/>
-                </a:solidFill>
-              </a:rPr>
-              <a:t>ecords</a:t>
             </a:r>
             <a:endParaRPr lang="pl-PL" sz="2400" dirty="0">
               <a:solidFill>
@@ -8303,7 +8170,7 @@
                 <a14:useLocalDpi xmlns:a14="http://schemas.microsoft.com/office/drawing/2010/main" val="0"/>
               </a:ext>
               <a:ext uri="{96DAC541-7B7A-43D3-8B79-37D633B846F1}">
-                <asvg:svgBlip xmlns="" xmlns:asvg="http://schemas.microsoft.com/office/drawing/2016/SVG/main" r:embed="rId3"/>
+                <asvg:svgBlip xmlns:asvg="http://schemas.microsoft.com/office/drawing/2016/SVG/main" xmlns="" r:embed="rId3"/>
               </a:ext>
             </a:extLst>
           </a:blip>
@@ -8342,7 +8209,7 @@
                 <a14:useLocalDpi xmlns:a14="http://schemas.microsoft.com/office/drawing/2010/main" val="0"/>
               </a:ext>
               <a:ext uri="{96DAC541-7B7A-43D3-8B79-37D633B846F1}">
-                <asvg:svgBlip xmlns="" xmlns:asvg="http://schemas.microsoft.com/office/drawing/2016/SVG/main" r:embed="rId5"/>
+                <asvg:svgBlip xmlns:asvg="http://schemas.microsoft.com/office/drawing/2016/SVG/main" xmlns="" r:embed="rId5"/>
               </a:ext>
             </a:extLst>
           </a:blip>
@@ -8381,7 +8248,7 @@
                 <a14:useLocalDpi xmlns:a14="http://schemas.microsoft.com/office/drawing/2010/main" val="0"/>
               </a:ext>
               <a:ext uri="{96DAC541-7B7A-43D3-8B79-37D633B846F1}">
-                <asvg:svgBlip xmlns="" xmlns:asvg="http://schemas.microsoft.com/office/drawing/2016/SVG/main" r:embed="rId7"/>
+                <asvg:svgBlip xmlns:asvg="http://schemas.microsoft.com/office/drawing/2016/SVG/main" xmlns="" r:embed="rId7"/>
               </a:ext>
             </a:extLst>
           </a:blip>

</xml_diff>

<commit_message>
sync revisions from sharepoint
</commit_message>
<xml_diff>
--- a/instructors/04-Public_repositories.pptx
+++ b/instructors/04-Public_repositories.pptx
@@ -134,6 +134,43 @@
 </p:presentation>
 </file>
 
+<file path=ppt/revisionInfo.xml><?xml version="1.0" encoding="utf-8"?>
+<p1510:revInfo xmlns:a="http://schemas.openxmlformats.org/drawingml/2006/main" xmlns:r="http://schemas.openxmlformats.org/officeDocument/2006/relationships" xmlns:p1510="http://schemas.microsoft.com/office/powerpoint/2015/10/main">
+  <p1510:revLst>
+    <p1510:client id="{3ECFB9FB-EA3B-A2B7-91E9-1DEAFE695B51}" v="8" dt="2022-12-16T16:27:52.886"/>
+  </p1510:revLst>
+</p1510:revInfo>
+</file>
+
+<file path=ppt/changesInfos/changesInfo1.xml><?xml version="1.0" encoding="utf-8"?>
+<pc:chgInfo xmlns:a="http://schemas.openxmlformats.org/drawingml/2006/main" xmlns:r="http://schemas.openxmlformats.org/officeDocument/2006/relationships" xmlns:ac="http://schemas.microsoft.com/office/drawing/2013/main/command" xmlns:pc="http://schemas.microsoft.com/office/powerpoint/2013/main/command">
+  <pc:docChgLst>
+    <pc:chgData name="Tomasz Zielinski" userId="S::tzielins@ed.ac.uk::d5c7bb8c-2ef3-45c1-b942-424604992d56" providerId="AD" clId="Web-{3ECFB9FB-EA3B-A2B7-91E9-1DEAFE695B51}"/>
+    <pc:docChg chg="modSld">
+      <pc:chgData name="Tomasz Zielinski" userId="S::tzielins@ed.ac.uk::d5c7bb8c-2ef3-45c1-b942-424604992d56" providerId="AD" clId="Web-{3ECFB9FB-EA3B-A2B7-91E9-1DEAFE695B51}" dt="2022-12-16T16:27:50.760" v="2" actId="20577"/>
+      <pc:docMkLst>
+        <pc:docMk/>
+      </pc:docMkLst>
+      <pc:sldChg chg="modSp">
+        <pc:chgData name="Tomasz Zielinski" userId="S::tzielins@ed.ac.uk::d5c7bb8c-2ef3-45c1-b942-424604992d56" providerId="AD" clId="Web-{3ECFB9FB-EA3B-A2B7-91E9-1DEAFE695B51}" dt="2022-12-16T16:27:50.760" v="2" actId="20577"/>
+        <pc:sldMkLst>
+          <pc:docMk/>
+          <pc:sldMk cId="1344113615" sldId="292"/>
+        </pc:sldMkLst>
+        <pc:spChg chg="mod">
+          <ac:chgData name="Tomasz Zielinski" userId="S::tzielins@ed.ac.uk::d5c7bb8c-2ef3-45c1-b942-424604992d56" providerId="AD" clId="Web-{3ECFB9FB-EA3B-A2B7-91E9-1DEAFE695B51}" dt="2022-12-16T16:27:50.760" v="2" actId="20577"/>
+          <ac:spMkLst>
+            <pc:docMk/>
+            <pc:sldMk cId="1344113615" sldId="292"/>
+            <ac:spMk id="2" creationId="{00000000-0000-0000-0000-000000000000}"/>
+          </ac:spMkLst>
+        </pc:spChg>
+      </pc:sldChg>
+    </pc:docChg>
+  </pc:docChgLst>
+</pc:chgInfo>
+</file>
+
 <file path=ppt/notesMasters/notesMaster1.xml><?xml version="1.0" encoding="utf-8"?>
 <p:notesMaster xmlns:a="http://schemas.openxmlformats.org/drawingml/2006/main" xmlns:r="http://schemas.openxmlformats.org/officeDocument/2006/relationships" xmlns:p="http://schemas.openxmlformats.org/presentationml/2006/main">
   <p:cSld>
@@ -216,7 +253,7 @@
           <a:p>
             <a:fld id="{585C48AE-4A1E-9A43-835F-510354165F99}" type="datetimeFigureOut">
               <a:rPr lang="en-GB" smtClean="0"/>
-              <a:t>14/12/2022</a:t>
+              <a:t>16/12/2022</a:t>
             </a:fld>
             <a:endParaRPr lang="en-GB" dirty="0"/>
           </a:p>
@@ -528,18 +565,18 @@
           <a:lstStyle/>
           <a:p>
             <a:r>
-              <a:rPr lang="en-GB" smtClean="0"/>
+              <a:rPr lang="en-GB"/>
               <a:t>IN A NUTSHELL:</a:t>
             </a:r>
             <a:r>
-              <a:rPr lang="en-GB" baseline="0" smtClean="0"/>
+              <a:rPr lang="en-GB" baseline="0"/>
               <a:t> </a:t>
             </a:r>
-            <a:endParaRPr lang="en-GB" smtClean="0"/>
-          </a:p>
-          <a:p>
-            <a:r>
-              <a:rPr lang="en-GB" smtClean="0"/>
+            <a:endParaRPr lang="en-GB"/>
+          </a:p>
+          <a:p>
+            <a:r>
+              <a:rPr lang="en-GB"/>
               <a:t>Findable </a:t>
             </a:r>
             <a:r>
@@ -688,7 +725,15 @@
           <a:p>
             <a:r>
               <a:rPr lang="en-GB" dirty="0"/>
-              <a:t>Dryad is an international open-access repository of research data.  It is a nonprofit organization that provides long-term access to its contents at no cost to users. The base DPC per data submission is $120 USD. Access is free.</a:t>
+              <a:t>Dryad is an international open-access repository of research data.  It is a nonprofit organization that provides long-term access to its contents at no cost to users. The base DPC per data submission is $120 USD. Some journals</a:t>
+            </a:r>
+            <a:r>
+              <a:rPr lang="en-GB" baseline="0" dirty="0"/>
+              <a:t> will pay this cost. </a:t>
+            </a:r>
+            <a:r>
+              <a:rPr lang="en-GB" dirty="0"/>
+              <a:t>Access is free.</a:t>
             </a:r>
           </a:p>
           <a:p>
@@ -715,19 +760,27 @@
           <a:p>
             <a:r>
               <a:rPr lang="en-GB" dirty="0"/>
-              <a:t>Dataverse is funded by Harvard with additional support from the Alfred P. Sloan Foundation, National Science Foundation, National Institutes of Health, Helmsley Charitable Trust, IQSS's Henry A. Murray Research Archive, and many others</a:t>
-            </a:r>
-            <a:r>
-              <a:rPr lang="en-GB"/>
-              <a:t>. </a:t>
-            </a:r>
-            <a:r>
-              <a:rPr lang="en-GB" smtClean="0"/>
-              <a:t>There are over</a:t>
-            </a:r>
-            <a:r>
-              <a:rPr lang="en-GB" baseline="0" smtClean="0"/>
-              <a:t> eighty repositories using the DataVerse project's repository software; the Harvard DataVerse repository accepts data from all researchers from any discipline. </a:t>
+              <a:t>Dataverse is funded by Harvard with additional support from the Alfred P. Sloan Foundation, National Science Foundation, National Institutes of Health, Helmsley Charitable Trust, IQSS's Henry A. Murray Research Archive, and many others. There are over</a:t>
+            </a:r>
+            <a:r>
+              <a:rPr lang="en-GB" baseline="0" dirty="0"/>
+              <a:t> eighty repositories using the </a:t>
+            </a:r>
+            <a:r>
+              <a:rPr lang="en-GB" baseline="0" dirty="0" err="1"/>
+              <a:t>DataVerse</a:t>
+            </a:r>
+            <a:r>
+              <a:rPr lang="en-GB" baseline="0" dirty="0"/>
+              <a:t> project's repository software; the Harvard </a:t>
+            </a:r>
+            <a:r>
+              <a:rPr lang="en-GB" baseline="0" dirty="0" err="1"/>
+              <a:t>DataVerse</a:t>
+            </a:r>
+            <a:r>
+              <a:rPr lang="en-GB" baseline="0" dirty="0"/>
+              <a:t> repository accepts data from all researchers from any discipline. </a:t>
             </a:r>
             <a:endParaRPr lang="en-GB" dirty="0"/>
           </a:p>
@@ -918,7 +971,7 @@
           <a:p>
             <a:fld id="{5913FB77-D8DB-4AB9-8EA5-EE8C3B57A5E1}" type="datetimeFigureOut">
               <a:rPr lang="en-GB" smtClean="0"/>
-              <a:t>14/12/2022</a:t>
+              <a:t>16/12/2022</a:t>
             </a:fld>
             <a:endParaRPr lang="en-GB" dirty="0"/>
           </a:p>
@@ -1165,7 +1218,7 @@
           <a:p>
             <a:fld id="{5913FB77-D8DB-4AB9-8EA5-EE8C3B57A5E1}" type="datetimeFigureOut">
               <a:rPr lang="en-GB" smtClean="0"/>
-              <a:t>14/12/2022</a:t>
+              <a:t>16/12/2022</a:t>
             </a:fld>
             <a:endParaRPr lang="en-GB" dirty="0"/>
           </a:p>
@@ -1375,7 +1428,7 @@
           <a:p>
             <a:fld id="{5913FB77-D8DB-4AB9-8EA5-EE8C3B57A5E1}" type="datetimeFigureOut">
               <a:rPr lang="en-GB" smtClean="0"/>
-              <a:t>14/12/2022</a:t>
+              <a:t>16/12/2022</a:t>
             </a:fld>
             <a:endParaRPr lang="en-GB" dirty="0"/>
           </a:p>
@@ -1575,7 +1628,7 @@
           <a:p>
             <a:fld id="{5913FB77-D8DB-4AB9-8EA5-EE8C3B57A5E1}" type="datetimeFigureOut">
               <a:rPr lang="en-GB" smtClean="0"/>
-              <a:t>14/12/2022</a:t>
+              <a:t>16/12/2022</a:t>
             </a:fld>
             <a:endParaRPr lang="en-GB" dirty="0"/>
           </a:p>
@@ -1851,7 +1904,7 @@
           <a:p>
             <a:fld id="{5913FB77-D8DB-4AB9-8EA5-EE8C3B57A5E1}" type="datetimeFigureOut">
               <a:rPr lang="en-GB" smtClean="0"/>
-              <a:t>14/12/2022</a:t>
+              <a:t>16/12/2022</a:t>
             </a:fld>
             <a:endParaRPr lang="en-GB" dirty="0"/>
           </a:p>
@@ -2119,7 +2172,7 @@
           <a:p>
             <a:fld id="{5913FB77-D8DB-4AB9-8EA5-EE8C3B57A5E1}" type="datetimeFigureOut">
               <a:rPr lang="en-GB" smtClean="0"/>
-              <a:t>14/12/2022</a:t>
+              <a:t>16/12/2022</a:t>
             </a:fld>
             <a:endParaRPr lang="en-GB" dirty="0"/>
           </a:p>
@@ -2534,7 +2587,7 @@
           <a:p>
             <a:fld id="{5913FB77-D8DB-4AB9-8EA5-EE8C3B57A5E1}" type="datetimeFigureOut">
               <a:rPr lang="en-GB" smtClean="0"/>
-              <a:t>14/12/2022</a:t>
+              <a:t>16/12/2022</a:t>
             </a:fld>
             <a:endParaRPr lang="en-GB" dirty="0"/>
           </a:p>
@@ -2676,7 +2729,7 @@
           <a:p>
             <a:fld id="{5913FB77-D8DB-4AB9-8EA5-EE8C3B57A5E1}" type="datetimeFigureOut">
               <a:rPr lang="en-GB" smtClean="0"/>
-              <a:t>14/12/2022</a:t>
+              <a:t>16/12/2022</a:t>
             </a:fld>
             <a:endParaRPr lang="en-GB" dirty="0"/>
           </a:p>
@@ -2789,7 +2842,7 @@
           <a:p>
             <a:fld id="{5913FB77-D8DB-4AB9-8EA5-EE8C3B57A5E1}" type="datetimeFigureOut">
               <a:rPr lang="en-GB" smtClean="0"/>
-              <a:t>14/12/2022</a:t>
+              <a:t>16/12/2022</a:t>
             </a:fld>
             <a:endParaRPr lang="en-GB" dirty="0"/>
           </a:p>
@@ -3102,7 +3155,7 @@
           <a:p>
             <a:fld id="{5913FB77-D8DB-4AB9-8EA5-EE8C3B57A5E1}" type="datetimeFigureOut">
               <a:rPr lang="en-GB" smtClean="0"/>
-              <a:t>14/12/2022</a:t>
+              <a:t>16/12/2022</a:t>
             </a:fld>
             <a:endParaRPr lang="en-GB" dirty="0"/>
           </a:p>
@@ -3391,7 +3444,7 @@
           <a:p>
             <a:fld id="{5913FB77-D8DB-4AB9-8EA5-EE8C3B57A5E1}" type="datetimeFigureOut">
               <a:rPr lang="en-GB" smtClean="0"/>
-              <a:t>14/12/2022</a:t>
+              <a:t>16/12/2022</a:t>
             </a:fld>
             <a:endParaRPr lang="en-GB" dirty="0"/>
           </a:p>
@@ -3633,7 +3686,7 @@
             <a:fld id="{5913FB77-D8DB-4AB9-8EA5-EE8C3B57A5E1}" type="datetimeFigureOut">
               <a:rPr lang="en-GB" smtClean="0"/>
               <a:pPr/>
-              <a:t>14/12/2022</a:t>
+              <a:t>16/12/2022</a:t>
             </a:fld>
             <a:endParaRPr lang="en-GB" dirty="0"/>
           </a:p>
@@ -4094,117 +4147,42 @@
           <a:chExt cx="0" cy="0"/>
         </a:xfrm>
       </p:grpSpPr>
-      <p:grpSp>
-        <p:nvGrpSpPr>
-          <p:cNvPr id="3" name="Group 2"/>
-          <p:cNvGrpSpPr/>
+      <p:sp>
+        <p:nvSpPr>
+          <p:cNvPr id="7" name="TextBox 6">
+            <a:extLst>
+              <a:ext uri="{FF2B5EF4-FFF2-40B4-BE49-F238E27FC236}">
+                <a16:creationId xmlns:a16="http://schemas.microsoft.com/office/drawing/2014/main" id="{441D6036-BCDA-4EC7-9653-F205FE226493}"/>
+              </a:ext>
+            </a:extLst>
+          </p:cNvPr>
+          <p:cNvSpPr txBox="1"/>
           <p:nvPr/>
-        </p:nvGrpSpPr>
-        <p:grpSpPr>
+        </p:nvSpPr>
+        <p:spPr>
           <a:xfrm>
-            <a:off x="335498" y="5785681"/>
-            <a:ext cx="7747345" cy="469783"/>
-            <a:chOff x="335498" y="5785681"/>
-            <a:chExt cx="7747345" cy="469783"/>
+            <a:off x="1092764" y="5835907"/>
+            <a:ext cx="6990079" cy="369332"/>
           </a:xfrm>
-        </p:grpSpPr>
-        <p:sp>
-          <p:nvSpPr>
-            <p:cNvPr id="7" name="TextBox 6">
-              <a:extLst>
-                <a:ext uri="{FF2B5EF4-FFF2-40B4-BE49-F238E27FC236}">
-                  <a16:creationId xmlns:a16="http://schemas.microsoft.com/office/drawing/2014/main" id="{441D6036-BCDA-4EC7-9653-F205FE226493}"/>
-                </a:ext>
-              </a:extLst>
-            </p:cNvPr>
-            <p:cNvSpPr txBox="1"/>
-            <p:nvPr/>
-          </p:nvSpPr>
-          <p:spPr>
-            <a:xfrm>
-              <a:off x="1092764" y="5835907"/>
-              <a:ext cx="6990079" cy="369332"/>
-            </a:xfrm>
-            <a:prstGeom prst="rect">
-              <a:avLst/>
-            </a:prstGeom>
-            <a:noFill/>
-          </p:spPr>
-          <p:txBody>
-            <a:bodyPr wrap="square">
-              <a:spAutoFit/>
-            </a:bodyPr>
-            <a:lstStyle/>
-            <a:p>
-              <a:r>
-                <a:rPr lang="en-GB"/>
-                <a:t>Open </a:t>
-              </a:r>
-              <a:r>
-                <a:rPr lang="en-GB" smtClean="0">
-                  <a:hlinkClick r:id="rId2"/>
-                </a:rPr>
-                <a:t>https://pad.carpentries.org/fair-4-leaders-begins-20YY-MM-DD</a:t>
-              </a:r>
-              <a:r>
-                <a:rPr lang="en-GB" smtClean="0"/>
-                <a:t>  </a:t>
-              </a:r>
-              <a:endParaRPr lang="en-GB" dirty="0">
-                <a:highlight>
-                  <a:srgbClr val="FFFF00"/>
-                </a:highlight>
-              </a:endParaRPr>
-            </a:p>
-          </p:txBody>
-        </p:sp>
-        <p:sp>
-          <p:nvSpPr>
-            <p:cNvPr id="8" name="Arrow: Down 7">
-              <a:extLst>
-                <a:ext uri="{FF2B5EF4-FFF2-40B4-BE49-F238E27FC236}">
-                  <a16:creationId xmlns:a16="http://schemas.microsoft.com/office/drawing/2014/main" id="{490697C4-1D52-44B3-9145-1E4126021820}"/>
-                </a:ext>
-              </a:extLst>
-            </p:cNvPr>
-            <p:cNvSpPr/>
-            <p:nvPr/>
-          </p:nvSpPr>
-          <p:spPr>
-            <a:xfrm rot="16200000">
-              <a:off x="410999" y="5710180"/>
-              <a:ext cx="469783" cy="620786"/>
-            </a:xfrm>
-            <a:prstGeom prst="downArrow">
-              <a:avLst/>
-            </a:prstGeom>
-          </p:spPr>
-          <p:style>
-            <a:lnRef idx="2">
-              <a:schemeClr val="accent1">
-                <a:shade val="50000"/>
-              </a:schemeClr>
-            </a:lnRef>
-            <a:fillRef idx="1">
-              <a:schemeClr val="accent1"/>
-            </a:fillRef>
-            <a:effectRef idx="0">
-              <a:schemeClr val="accent1"/>
-            </a:effectRef>
-            <a:fontRef idx="minor">
-              <a:schemeClr val="lt1"/>
-            </a:fontRef>
-          </p:style>
-          <p:txBody>
-            <a:bodyPr rtlCol="0" anchor="ctr"/>
-            <a:lstStyle/>
-            <a:p>
-              <a:pPr algn="ctr"/>
-              <a:endParaRPr lang="en-GB" dirty="0"/>
-            </a:p>
-          </p:txBody>
-        </p:sp>
-      </p:grpSp>
+          <a:prstGeom prst="rect">
+            <a:avLst/>
+          </a:prstGeom>
+          <a:noFill/>
+        </p:spPr>
+        <p:txBody>
+          <a:bodyPr wrap="square">
+            <a:spAutoFit/>
+          </a:bodyPr>
+          <a:lstStyle/>
+          <a:p>
+            <a:endParaRPr lang="en-GB" dirty="0">
+              <a:highlight>
+                <a:srgbClr val="FFFF00"/>
+              </a:highlight>
+            </a:endParaRPr>
+          </a:p>
+        </p:txBody>
+      </p:sp>
       <p:sp>
         <p:nvSpPr>
           <p:cNvPr id="2" name="Rectangle 1"/>
@@ -4252,13 +4230,6 @@
   <p:clrMapOvr>
     <a:masterClrMapping/>
   </p:clrMapOvr>
-  <p:timing>
-    <p:tnLst>
-      <p:par>
-        <p:cTn id="1" dur="indefinite" restart="never" nodeType="tmRoot"/>
-      </p:par>
-    </p:tnLst>
-  </p:timing>
 </p:sld>
 </file>
 
@@ -4376,7 +4347,23 @@
                   <a:srgbClr val="0070C0"/>
                 </a:solidFill>
               </a:rPr>
-              <a:t>Data specific features (e.g. Visulization)</a:t>
+              <a:t>Data specific features (e.g. Visu</a:t>
+            </a:r>
+            <a:r>
+              <a:rPr lang="en-GB" sz="2400" dirty="0">
+                <a:solidFill>
+                  <a:srgbClr val="0070C0"/>
+                </a:solidFill>
+              </a:rPr>
+              <a:t>a</a:t>
+            </a:r>
+            <a:r>
+              <a:rPr lang="pl-PL" sz="2400" dirty="0">
+                <a:solidFill>
+                  <a:srgbClr val="0070C0"/>
+                </a:solidFill>
+              </a:rPr>
+              <a:t>lization)</a:t>
             </a:r>
           </a:p>
           <a:p>
@@ -4404,26 +4391,10 @@
                   <a:srgbClr val="0070C0"/>
                 </a:solidFill>
               </a:rPr>
-              <a:t>API for data retrival </a:t>
-            </a:r>
-            <a:r>
-              <a:rPr lang="pl-PL" sz="2400">
-                <a:solidFill>
-                  <a:srgbClr val="0070C0"/>
-                </a:solidFill>
-              </a:rPr>
-              <a:t>/ </a:t>
-            </a:r>
-            <a:r>
-              <a:rPr lang="pl-PL" sz="2400" smtClean="0">
-                <a:solidFill>
-                  <a:srgbClr val="0070C0"/>
-                </a:solidFill>
-              </a:rPr>
-              <a:t>ag</a:t>
-            </a:r>
-            <a:r>
-              <a:rPr lang="en-GB" sz="2400" smtClean="0">
+              <a:t>API for data retrival / ag</a:t>
+            </a:r>
+            <a:r>
+              <a:rPr lang="en-GB" sz="2400" dirty="0">
                 <a:solidFill>
                   <a:srgbClr val="0070C0"/>
                 </a:solidFill>
@@ -4431,20 +4402,12 @@
               <a:t>g</a:t>
             </a:r>
             <a:r>
-              <a:rPr lang="pl-PL" sz="2400" smtClean="0">
-                <a:solidFill>
-                  <a:srgbClr val="0070C0"/>
-                </a:solidFill>
-              </a:rPr>
-              <a:t>regation </a:t>
-            </a:r>
-            <a:r>
               <a:rPr lang="pl-PL" sz="2400" dirty="0">
                 <a:solidFill>
                   <a:srgbClr val="0070C0"/>
                 </a:solidFill>
               </a:rPr>
-              <a:t>/searching</a:t>
+              <a:t>regation /searching</a:t>
             </a:r>
           </a:p>
           <a:p>
@@ -4531,7 +4494,7 @@
           <a:lstStyle/>
           <a:p>
             <a:r>
-              <a:rPr lang="en-GB" smtClean="0">
+              <a:rPr lang="en-GB">
                 <a:solidFill>
                   <a:srgbClr val="0070C0"/>
                 </a:solidFill>
@@ -4539,7 +4502,7 @@
               <a:t>Advantages of d</a:t>
             </a:r>
             <a:r>
-              <a:rPr lang="pl-PL" smtClean="0">
+              <a:rPr lang="pl-PL">
                 <a:solidFill>
                   <a:srgbClr val="0070C0"/>
                 </a:solidFill>
@@ -4881,7 +4844,7 @@
               <a:buChar char="•"/>
             </a:pPr>
             <a:r>
-              <a:rPr lang="pl-PL" sz="2400" b="0" i="0" dirty="0" smtClean="0">
+              <a:rPr lang="pl-PL" sz="2400" b="0" i="0" dirty="0">
                 <a:solidFill>
                   <a:srgbClr val="333333"/>
                 </a:solidFill>
@@ -4891,24 +4854,14 @@
               <a:t> </a:t>
             </a:r>
             <a:r>
-              <a:rPr lang="en-GB" sz="2400" b="0" i="0" dirty="0" smtClean="0">
+              <a:rPr lang="en-GB" sz="2400" b="0" i="0" dirty="0">
                 <a:solidFill>
                   <a:srgbClr val="333333"/>
                 </a:solidFill>
                 <a:effectLst/>
                 <a:latin typeface="Ubuntu"/>
               </a:rPr>
-              <a:t>The </a:t>
-            </a:r>
-            <a:r>
-              <a:rPr lang="en-GB" sz="2400" b="0" i="0" dirty="0">
-                <a:solidFill>
-                  <a:srgbClr val="333333"/>
-                </a:solidFill>
-                <a:effectLst/>
-                <a:latin typeface="Ubuntu"/>
-              </a:rPr>
-              <a:t>repository is more relevant to your discipline than a generalist one.</a:t>
+              <a:t>The repository is more relevant to your discipline than a generalist one.</a:t>
             </a:r>
           </a:p>
           <a:p>
@@ -4920,7 +4873,7 @@
               <a:buChar char="•"/>
             </a:pPr>
             <a:r>
-              <a:rPr lang="pl-PL" sz="2400" b="0" i="0" dirty="0" smtClean="0">
+              <a:rPr lang="pl-PL" sz="2400" b="0" i="0" dirty="0">
                 <a:solidFill>
                   <a:srgbClr val="333333"/>
                 </a:solidFill>
@@ -4930,24 +4883,14 @@
               <a:t> </a:t>
             </a:r>
             <a:r>
-              <a:rPr lang="en-GB" sz="2400" b="0" i="0" dirty="0" smtClean="0">
+              <a:rPr lang="en-GB" sz="2400" b="0" i="0" dirty="0">
                 <a:solidFill>
                   <a:srgbClr val="333333"/>
                 </a:solidFill>
                 <a:effectLst/>
                 <a:latin typeface="Ubuntu"/>
               </a:rPr>
-              <a:t>Higher </a:t>
-            </a:r>
-            <a:r>
-              <a:rPr lang="en-GB" sz="2400" b="0" i="0" dirty="0">
-                <a:solidFill>
-                  <a:srgbClr val="333333"/>
-                </a:solidFill>
-                <a:effectLst/>
-                <a:latin typeface="Ubuntu"/>
-              </a:rPr>
-              <a:t>exposure (people looking for those specific types of data will usually first look at the specific repository).</a:t>
+              <a:t>Higher exposure (people looking for those specific types of data will usually first look at the specific repository).</a:t>
             </a:r>
           </a:p>
           <a:p>
@@ -4959,7 +4902,7 @@
               <a:buChar char="•"/>
             </a:pPr>
             <a:r>
-              <a:rPr lang="pl-PL" sz="2400" b="0" i="0" dirty="0" smtClean="0">
+              <a:rPr lang="pl-PL" sz="2400" b="0" i="0" dirty="0">
                 <a:solidFill>
                   <a:srgbClr val="333333"/>
                 </a:solidFill>
@@ -4969,24 +4912,14 @@
               <a:t> </a:t>
             </a:r>
             <a:r>
-              <a:rPr lang="en-GB" sz="2400" b="0" i="0" dirty="0" smtClean="0">
+              <a:rPr lang="en-GB" sz="2400" b="0" i="0" dirty="0">
                 <a:solidFill>
                   <a:srgbClr val="333333"/>
                 </a:solidFill>
                 <a:effectLst/>
                 <a:latin typeface="Ubuntu"/>
               </a:rPr>
-              <a:t>Higher </a:t>
-            </a:r>
-            <a:r>
-              <a:rPr lang="en-GB" sz="2400" b="0" i="0" dirty="0">
-                <a:solidFill>
-                  <a:srgbClr val="333333"/>
-                </a:solidFill>
-                <a:effectLst/>
-                <a:latin typeface="Ubuntu"/>
-              </a:rPr>
-              <a:t>number of citations (see above).</a:t>
+              <a:t>Higher number of citations (see above).</a:t>
             </a:r>
           </a:p>
         </p:txBody>
@@ -5047,7 +4980,7 @@
               <a:buChar char="•"/>
             </a:pPr>
             <a:r>
-              <a:rPr lang="en-GB" sz="2000" smtClean="0">
+              <a:rPr lang="en-GB" sz="2000">
                 <a:solidFill>
                   <a:srgbClr val="0070C0"/>
                 </a:solidFill>
@@ -5068,15 +5001,7 @@
                   <a:srgbClr val="0070C0"/>
                 </a:solidFill>
               </a:rPr>
-              <a:t>Springer </a:t>
-            </a:r>
-            <a:r>
-              <a:rPr lang="en-GB" sz="2000" smtClean="0">
-                <a:solidFill>
-                  <a:srgbClr val="0070C0"/>
-                </a:solidFill>
-              </a:rPr>
-              <a:t>Nature </a:t>
+              <a:t>Springer Nature </a:t>
             </a:r>
             <a:r>
               <a:rPr lang="en-GB" sz="2000" dirty="0">
@@ -5095,7 +5020,7 @@
               <a:buChar char="•"/>
             </a:pPr>
             <a:r>
-              <a:rPr lang="en-GB" sz="2000" smtClean="0">
+              <a:rPr lang="en-GB" sz="2000">
                 <a:solidFill>
                   <a:srgbClr val="0070C0"/>
                 </a:solidFill>
@@ -5119,7 +5044,7 @@
               <a:buChar char="•"/>
             </a:pPr>
             <a:r>
-              <a:rPr lang="en-GB" sz="2000" smtClean="0">
+              <a:rPr lang="en-GB" sz="2000">
                 <a:solidFill>
                   <a:srgbClr val="0070C0"/>
                 </a:solidFill>
@@ -5143,7 +5068,7 @@
               <a:buChar char="•"/>
             </a:pPr>
             <a:r>
-              <a:rPr lang="en-GB" sz="2000" smtClean="0">
+              <a:rPr lang="en-GB" sz="2000">
                 <a:solidFill>
                   <a:srgbClr val="0070C0"/>
                 </a:solidFill>
@@ -5167,7 +5092,7 @@
               <a:buChar char="•"/>
             </a:pPr>
             <a:r>
-              <a:rPr lang="en-GB" sz="2000" smtClean="0">
+              <a:rPr lang="en-GB" sz="2000">
                 <a:solidFill>
                   <a:srgbClr val="0070C0"/>
                 </a:solidFill>
@@ -5191,28 +5116,12 @@
               <a:buChar char="•"/>
             </a:pPr>
             <a:r>
-              <a:rPr lang="en-GB" sz="2000" smtClean="0">
-                <a:solidFill>
-                  <a:srgbClr val="0070C0"/>
-                </a:solidFill>
-              </a:rPr>
-              <a:t>GIGAscience </a:t>
-            </a:r>
-            <a:r>
               <a:rPr lang="en-GB" sz="2000">
                 <a:solidFill>
                   <a:srgbClr val="0070C0"/>
                 </a:solidFill>
               </a:rPr>
-              <a:t>- </a:t>
-            </a:r>
-            <a:r>
-              <a:rPr lang="en-GB" sz="2000" smtClean="0">
-                <a:solidFill>
-                  <a:srgbClr val="0070C0"/>
-                </a:solidFill>
-              </a:rPr>
-              <a:t>OUP </a:t>
+              <a:t>GIGAscience - OUP </a:t>
             </a:r>
             <a:r>
               <a:rPr lang="en-GB" sz="2000" dirty="0">
@@ -5231,7 +5140,7 @@
               <a:buChar char="•"/>
             </a:pPr>
             <a:r>
-              <a:rPr lang="en-GB" sz="2000" smtClean="0">
+              <a:rPr lang="en-GB" sz="2000">
                 <a:solidFill>
                   <a:srgbClr val="0070C0"/>
                 </a:solidFill>
@@ -5255,7 +5164,7 @@
               <a:buChar char="•"/>
             </a:pPr>
             <a:r>
-              <a:rPr lang="en-GB" sz="2000" smtClean="0">
+              <a:rPr lang="en-GB" sz="2000">
                 <a:solidFill>
                   <a:srgbClr val="0070C0"/>
                 </a:solidFill>
@@ -5276,15 +5185,7 @@
                   <a:srgbClr val="0070C0"/>
                 </a:solidFill>
               </a:rPr>
-              <a:t>- </a:t>
-            </a:r>
-            <a:r>
-              <a:rPr lang="en-GB" sz="2000" smtClean="0">
-                <a:solidFill>
-                  <a:srgbClr val="0070C0"/>
-                </a:solidFill>
-              </a:rPr>
-              <a:t>Nature </a:t>
+              <a:t>- Nature </a:t>
             </a:r>
             <a:r>
               <a:rPr lang="en-GB" sz="2000" dirty="0">
@@ -5303,28 +5204,12 @@
               <a:buChar char="•"/>
             </a:pPr>
             <a:r>
-              <a:rPr lang="en-GB" sz="2000" smtClean="0">
-                <a:solidFill>
-                  <a:srgbClr val="0070C0"/>
-                </a:solidFill>
-              </a:rPr>
-              <a:t>Taylor </a:t>
-            </a:r>
-            <a:r>
               <a:rPr lang="en-GB" sz="2000">
                 <a:solidFill>
                   <a:srgbClr val="0070C0"/>
                 </a:solidFill>
               </a:rPr>
-              <a:t>and </a:t>
-            </a:r>
-            <a:r>
-              <a:rPr lang="en-GB" sz="2000" smtClean="0">
-                <a:solidFill>
-                  <a:srgbClr val="0070C0"/>
-                </a:solidFill>
-              </a:rPr>
-              <a:t>Francis </a:t>
+              <a:t>Taylor and Francis </a:t>
             </a:r>
             <a:r>
               <a:rPr lang="en-GB" sz="2000" dirty="0">
@@ -5343,7 +5228,7 @@
               <a:buChar char="•"/>
             </a:pPr>
             <a:r>
-              <a:rPr lang="en-GB" sz="2000" smtClean="0">
+              <a:rPr lang="en-GB" sz="2000">
                 <a:solidFill>
                   <a:srgbClr val="0070C0"/>
                 </a:solidFill>
@@ -5367,7 +5252,7 @@
               <a:buChar char="•"/>
             </a:pPr>
             <a:r>
-              <a:rPr lang="en-GB" sz="2000" smtClean="0">
+              <a:rPr lang="en-GB" sz="2000">
                 <a:solidFill>
                   <a:srgbClr val="0070C0"/>
                 </a:solidFill>
@@ -5391,7 +5276,7 @@
               <a:buChar char="•"/>
             </a:pPr>
             <a:r>
-              <a:rPr lang="en-GB" sz="2000" smtClean="0">
+              <a:rPr lang="en-GB" sz="2000">
                 <a:solidFill>
                   <a:srgbClr val="0070C0"/>
                 </a:solidFill>
@@ -5415,28 +5300,12 @@
               <a:buChar char="•"/>
             </a:pPr>
             <a:r>
-              <a:rPr lang="en-GB" sz="2000" smtClean="0">
-                <a:solidFill>
-                  <a:srgbClr val="0070C0"/>
-                </a:solidFill>
-              </a:rPr>
-              <a:t>Wellcome </a:t>
-            </a:r>
-            <a:r>
               <a:rPr lang="en-GB" sz="2000">
                 <a:solidFill>
                   <a:srgbClr val="0070C0"/>
                 </a:solidFill>
               </a:rPr>
-              <a:t>Open </a:t>
-            </a:r>
-            <a:r>
-              <a:rPr lang="en-GB" sz="2000" smtClean="0">
-                <a:solidFill>
-                  <a:srgbClr val="0070C0"/>
-                </a:solidFill>
-              </a:rPr>
-              <a:t>Research </a:t>
+              <a:t>Wellcome Open Research </a:t>
             </a:r>
             <a:r>
               <a:rPr lang="en-GB" sz="2000" dirty="0">
@@ -5478,18 +5347,13 @@
           <a:lstStyle/>
           <a:p>
             <a:r>
-              <a:rPr lang="en-GB" dirty="0" smtClean="0">
+              <a:rPr lang="en-GB" dirty="0">
                 <a:solidFill>
                   <a:srgbClr val="0070C0"/>
                 </a:solidFill>
               </a:rPr>
               <a:t>Finding repositories – use recommendations</a:t>
             </a:r>
-            <a:endParaRPr lang="en-GB" dirty="0">
-              <a:solidFill>
-                <a:srgbClr val="0070C0"/>
-              </a:solidFill>
-            </a:endParaRPr>
           </a:p>
         </p:txBody>
       </p:sp>
@@ -5965,25 +5829,8 @@
                 <a:effectLst/>
                 <a:latin typeface="Ubuntu"/>
               </a:rPr>
-              <a:t>Find a repo for </a:t>
-            </a:r>
-            <a:r>
-              <a:rPr lang="en-GB" sz="2000" b="1" i="0" dirty="0" smtClean="0">
-                <a:solidFill>
-                  <a:srgbClr val="333333"/>
-                </a:solidFill>
-                <a:effectLst/>
-                <a:latin typeface="Ubuntu"/>
-              </a:rPr>
-              <a:t>genomics data:</a:t>
-            </a:r>
-            <a:endParaRPr lang="en-GB" sz="2000" b="1" i="0" dirty="0">
-              <a:solidFill>
-                <a:srgbClr val="333333"/>
-              </a:solidFill>
-              <a:effectLst/>
-              <a:latin typeface="Ubuntu"/>
-            </a:endParaRPr>
+              <a:t>Find a repo for genomics data:</a:t>
+            </a:r>
           </a:p>
           <a:p>
             <a:pPr>
@@ -6056,7 +5903,7 @@
           <a:lstStyle/>
           <a:p>
             <a:r>
-              <a:rPr lang="en-GB" sz="2000" b="1" dirty="0" smtClean="0">
+              <a:rPr lang="en-GB" sz="2000" b="1" dirty="0">
                 <a:solidFill>
                   <a:srgbClr val="0070C0"/>
                 </a:solidFill>
@@ -6081,20 +5928,12 @@
               <a:t>2. </a:t>
             </a:r>
             <a:r>
-              <a:rPr lang="en-GB" sz="2000" b="1" dirty="0" smtClean="0">
-                <a:solidFill>
-                  <a:srgbClr val="0070C0"/>
-                </a:solidFill>
-              </a:rPr>
-              <a:t>Quality </a:t>
-            </a:r>
-            <a:r>
               <a:rPr lang="en-GB" sz="2000" b="1" dirty="0">
                 <a:solidFill>
                   <a:srgbClr val="0070C0"/>
                 </a:solidFill>
               </a:rPr>
-              <a:t>of </a:t>
+              <a:t>Quality of </a:t>
             </a:r>
             <a:r>
               <a:rPr lang="en-GB" sz="2000" b="1">
@@ -6105,7 +5944,7 @@
               <a:t>interaction</a:t>
             </a:r>
             <a:r>
-              <a:rPr lang="pl-PL" sz="2000" b="1" smtClean="0">
+              <a:rPr lang="pl-PL" sz="2000" b="1">
                 <a:solidFill>
                   <a:srgbClr val="0070C0"/>
                 </a:solidFill>
@@ -6113,7 +5952,7 @@
               <a:t>/interface</a:t>
             </a:r>
             <a:r>
-              <a:rPr lang="en-GB" sz="2000" b="1" smtClean="0">
+              <a:rPr lang="en-GB" sz="2000" b="1">
                 <a:solidFill>
                   <a:srgbClr val="0070C0"/>
                 </a:solidFill>
@@ -6152,44 +5991,12 @@
               <a:t>I</a:t>
             </a:r>
             <a:r>
-              <a:rPr lang="en-GB" sz="2000" smtClean="0">
-                <a:solidFill>
-                  <a:srgbClr val="0070C0"/>
-                </a:solidFill>
-              </a:rPr>
-              <a:t>s </a:t>
-            </a:r>
-            <a:r>
               <a:rPr lang="en-GB" sz="2000">
                 <a:solidFill>
                   <a:srgbClr val="0070C0"/>
                 </a:solidFill>
               </a:rPr>
-              <a:t>the </a:t>
-            </a:r>
-            <a:r>
-              <a:rPr lang="en-GB" sz="2000" smtClean="0">
-                <a:solidFill>
-                  <a:srgbClr val="0070C0"/>
-                </a:solidFill>
-              </a:rPr>
-              <a:t>interaction </a:t>
-            </a:r>
-            <a:r>
-              <a:rPr lang="en-GB" sz="2000">
-                <a:solidFill>
-                  <a:srgbClr val="0070C0"/>
-                </a:solidFill>
-              </a:rPr>
-              <a:t>for </a:t>
-            </a:r>
-            <a:r>
-              <a:rPr lang="en-GB" sz="2000" smtClean="0">
-                <a:solidFill>
-                  <a:srgbClr val="0070C0"/>
-                </a:solidFill>
-              </a:rPr>
-              <a:t>the purposes </a:t>
+              <a:t>s the interaction for the purposes </a:t>
             </a:r>
             <a:r>
               <a:rPr lang="en-GB" sz="2000" dirty="0">
@@ -6227,20 +6034,12 @@
               <a:t>3. </a:t>
             </a:r>
             <a:r>
-              <a:rPr lang="en-GB" sz="2000" b="1" dirty="0" smtClean="0">
-                <a:solidFill>
-                  <a:srgbClr val="0070C0"/>
-                </a:solidFill>
-              </a:rPr>
-              <a:t>Take-up </a:t>
-            </a:r>
-            <a:r>
               <a:rPr lang="en-GB" sz="2000" b="1" dirty="0">
                 <a:solidFill>
                   <a:srgbClr val="0070C0"/>
                 </a:solidFill>
               </a:rPr>
-              <a:t>and impact: </a:t>
+              <a:t>Take-up and impact: </a:t>
             </a:r>
             <a:endParaRPr lang="pl-PL" sz="2000" b="1" dirty="0">
               <a:solidFill>
@@ -6258,7 +6057,7 @@
               <a:t>	</a:t>
             </a:r>
             <a:r>
-              <a:rPr lang="en-GB" sz="2000" smtClean="0">
+              <a:rPr lang="en-GB" sz="2000">
                 <a:solidFill>
                   <a:srgbClr val="0070C0"/>
                 </a:solidFill>
@@ -6297,7 +6096,7 @@
               <a:t>	</a:t>
             </a:r>
             <a:r>
-              <a:rPr lang="en-GB" sz="2000" smtClean="0">
+              <a:rPr lang="en-GB" sz="2000">
                 <a:solidFill>
                   <a:srgbClr val="0070C0"/>
                 </a:solidFill>
@@ -6336,7 +6135,7 @@
               <a:t>	</a:t>
             </a:r>
             <a:r>
-              <a:rPr lang="en-GB" sz="2000" smtClean="0">
+              <a:rPr lang="en-GB" sz="2000">
                 <a:solidFill>
                   <a:srgbClr val="0070C0"/>
                 </a:solidFill>
@@ -6375,7 +6174,7 @@
               <a:t>	</a:t>
             </a:r>
             <a:r>
-              <a:rPr lang="en-GB" sz="2000" smtClean="0">
+              <a:rPr lang="en-GB" sz="2000">
                 <a:solidFill>
                   <a:srgbClr val="0070C0"/>
                 </a:solidFill>
@@ -6383,7 +6182,7 @@
               <a:t>I</a:t>
             </a:r>
             <a:r>
-              <a:rPr lang="pl-PL" sz="2000" smtClean="0">
+              <a:rPr lang="pl-PL" sz="2000">
                 <a:solidFill>
                   <a:srgbClr val="0070C0"/>
                 </a:solidFill>
@@ -6391,7 +6190,7 @@
               <a:t>s</a:t>
             </a:r>
             <a:r>
-              <a:rPr lang="en-GB" sz="2000" smtClean="0">
+              <a:rPr lang="en-GB" sz="2000">
                 <a:solidFill>
                   <a:srgbClr val="0070C0"/>
                 </a:solidFill>
@@ -6430,7 +6229,7 @@
               <a:t>	</a:t>
             </a:r>
             <a:r>
-              <a:rPr lang="en-GB" sz="2000" smtClean="0">
+              <a:rPr lang="en-GB" sz="2000">
                 <a:solidFill>
                   <a:srgbClr val="0070C0"/>
                 </a:solidFill>
@@ -6468,20 +6267,12 @@
               <a:t>4. </a:t>
             </a:r>
             <a:r>
-              <a:rPr lang="en-GB" sz="2000" b="1" dirty="0" smtClean="0">
-                <a:solidFill>
-                  <a:srgbClr val="0070C0"/>
-                </a:solidFill>
-              </a:rPr>
-              <a:t>Policy </a:t>
-            </a:r>
-            <a:r>
               <a:rPr lang="en-GB" sz="2000" b="1" dirty="0">
                 <a:solidFill>
                   <a:srgbClr val="0070C0"/>
                 </a:solidFill>
               </a:rPr>
-              <a:t>and process: </a:t>
+              <a:t>Policy and process: </a:t>
             </a:r>
             <a:r>
               <a:rPr lang="pl-PL" sz="2000" dirty="0">
@@ -6515,7 +6306,7 @@
               <a:t>D</a:t>
             </a:r>
             <a:r>
-              <a:rPr lang="en-GB" sz="2000" smtClean="0">
+              <a:rPr lang="en-GB" sz="2000">
                 <a:solidFill>
                   <a:srgbClr val="0070C0"/>
                 </a:solidFill>
@@ -6536,15 +6327,7 @@
                   <a:srgbClr val="0070C0"/>
                 </a:solidFill>
               </a:rPr>
-              <a:t>help </a:t>
-            </a:r>
-            <a:r>
-              <a:rPr lang="en-GB" sz="2000" smtClean="0">
-                <a:solidFill>
-                  <a:srgbClr val="0070C0"/>
-                </a:solidFill>
-              </a:rPr>
-              <a:t>me to meet </a:t>
+              <a:t>help me to meet </a:t>
             </a:r>
             <a:r>
               <a:rPr lang="en-GB" sz="2000" dirty="0">
@@ -6576,15 +6359,7 @@
                   <a:srgbClr val="0070C0"/>
                 </a:solidFill>
               </a:rPr>
-              <a:t>good </a:t>
-            </a:r>
-            <a:r>
-              <a:rPr lang="en-GB" sz="2000" smtClean="0">
-                <a:solidFill>
-                  <a:srgbClr val="0070C0"/>
-                </a:solidFill>
-              </a:rPr>
-              <a:t>practice </a:t>
+              <a:t>good practice </a:t>
             </a:r>
             <a:r>
               <a:rPr lang="pl-PL" sz="2000" dirty="0">
@@ -6626,7 +6401,7 @@
               <a:t>	</a:t>
             </a:r>
             <a:r>
-              <a:rPr lang="en-GB" sz="2000" smtClean="0">
+              <a:rPr lang="en-GB" sz="2000">
                 <a:solidFill>
                   <a:srgbClr val="0070C0"/>
                 </a:solidFill>
@@ -6634,7 +6409,7 @@
               <a:t>I</a:t>
             </a:r>
             <a:r>
-              <a:rPr lang="pl-PL" sz="2000" smtClean="0">
+              <a:rPr lang="pl-PL" sz="2000">
                 <a:solidFill>
                   <a:srgbClr val="0070C0"/>
                 </a:solidFill>
@@ -6642,7 +6417,7 @@
               <a:t>s </a:t>
             </a:r>
             <a:r>
-              <a:rPr lang="en-GB" sz="2000" dirty="0" smtClean="0">
+              <a:rPr lang="en-GB" sz="2000" dirty="0">
                 <a:solidFill>
                   <a:srgbClr val="0070C0"/>
                 </a:solidFill>
@@ -6650,7 +6425,7 @@
               <a:t>it</a:t>
             </a:r>
             <a:r>
-              <a:rPr lang="pl-PL" sz="2000" dirty="0" smtClean="0">
+              <a:rPr lang="pl-PL" sz="2000" dirty="0">
                 <a:solidFill>
                   <a:srgbClr val="0070C0"/>
                 </a:solidFill>
@@ -6658,7 +6433,7 @@
               <a:t> </a:t>
             </a:r>
             <a:r>
-              <a:rPr lang="en-GB" sz="2000" dirty="0" smtClean="0">
+              <a:rPr lang="en-GB" sz="2000" dirty="0">
                 <a:solidFill>
                   <a:srgbClr val="0070C0"/>
                 </a:solidFill>
@@ -6666,20 +6441,12 @@
               <a:t>c</a:t>
             </a:r>
             <a:r>
-              <a:rPr lang="pl-PL" sz="2000" dirty="0" smtClean="0">
-                <a:solidFill>
-                  <a:srgbClr val="0070C0"/>
-                </a:solidFill>
-              </a:rPr>
-              <a:t>urated</a:t>
-            </a:r>
-            <a:r>
               <a:rPr lang="pl-PL" sz="2000" dirty="0">
                 <a:solidFill>
                   <a:srgbClr val="0070C0"/>
                 </a:solidFill>
               </a:rPr>
-              <a:t>?</a:t>
+              <a:t>urated?</a:t>
             </a:r>
           </a:p>
         </p:txBody>
@@ -6778,7 +6545,7 @@
           <a:lstStyle/>
           <a:p>
             <a:r>
-              <a:rPr lang="en-GB" smtClean="0">
+              <a:rPr lang="en-GB">
                 <a:solidFill>
                   <a:srgbClr val="0070C0"/>
                 </a:solidFill>
@@ -6786,7 +6553,7 @@
               <a:t>Using</a:t>
             </a:r>
             <a:r>
-              <a:rPr lang="pl-PL" smtClean="0">
+              <a:rPr lang="pl-PL">
                 <a:solidFill>
                   <a:srgbClr val="0070C0"/>
                 </a:solidFill>
@@ -6794,7 +6561,7 @@
               <a:t> repositor</a:t>
             </a:r>
             <a:r>
-              <a:rPr lang="en-GB" smtClean="0">
+              <a:rPr lang="en-GB">
                 <a:solidFill>
                   <a:srgbClr val="0070C0"/>
                 </a:solidFill>
@@ -6851,15 +6618,7 @@
                   <a:srgbClr val="0070C0"/>
                 </a:solidFill>
               </a:rPr>
-              <a:t> </a:t>
-            </a:r>
-            <a:r>
-              <a:rPr lang="en-GB" sz="4000" dirty="0" smtClean="0">
-                <a:solidFill>
-                  <a:srgbClr val="0070C0"/>
-                </a:solidFill>
-              </a:rPr>
-              <a:t>5</a:t>
+              <a:t> 5</a:t>
             </a:r>
             <a:endParaRPr lang="pl-PL" sz="4000" dirty="0">
               <a:solidFill>
@@ -6939,18 +6698,13 @@
               <a:buChar char="•"/>
             </a:pPr>
             <a:r>
-              <a:rPr lang="en-GB" sz="2400" dirty="0" smtClean="0">
+              <a:rPr lang="en-GB" sz="2400" dirty="0">
                 <a:solidFill>
                   <a:srgbClr val="0070C0"/>
                 </a:solidFill>
               </a:rPr>
               <a:t>Repository records are another form of scientific output!</a:t>
             </a:r>
-            <a:endParaRPr lang="en-GB" sz="2400" dirty="0">
-              <a:solidFill>
-                <a:srgbClr val="0070C0"/>
-              </a:solidFill>
-            </a:endParaRPr>
           </a:p>
           <a:p>
             <a:pPr marL="285750" indent="-285750">
@@ -6961,31 +6715,15 @@
               <a:buChar char="•"/>
             </a:pPr>
             <a:r>
-              <a:rPr lang="en-GB" sz="2400" dirty="0" smtClean="0">
-                <a:solidFill>
-                  <a:srgbClr val="0070C0"/>
-                </a:solidFill>
-              </a:rPr>
-              <a:t>Add a good Data </a:t>
-            </a:r>
-            <a:r>
               <a:rPr lang="en-GB" sz="2400" dirty="0">
                 <a:solidFill>
                   <a:srgbClr val="0070C0"/>
                 </a:solidFill>
               </a:rPr>
-              <a:t>A</a:t>
-            </a:r>
-            <a:r>
-              <a:rPr lang="en-GB" sz="2400" dirty="0" smtClean="0">
-                <a:solidFill>
-                  <a:srgbClr val="0070C0"/>
-                </a:solidFill>
-              </a:rPr>
-              <a:t>vailability</a:t>
-            </a:r>
-            <a:r>
-              <a:rPr lang="pl-PL" sz="2400" dirty="0" smtClean="0">
+              <a:t>Add a good Data Availability</a:t>
+            </a:r>
+            <a:r>
+              <a:rPr lang="pl-PL" sz="2400" dirty="0">
                 <a:solidFill>
                   <a:srgbClr val="0070C0"/>
                 </a:solidFill>
@@ -6998,23 +6736,7 @@
                   <a:srgbClr val="0070C0"/>
                 </a:solidFill>
               </a:rPr>
-              <a:t>S</a:t>
-            </a:r>
-            <a:r>
-              <a:rPr lang="en-GB" sz="2400" dirty="0" smtClean="0">
-                <a:solidFill>
-                  <a:srgbClr val="0070C0"/>
-                </a:solidFill>
-              </a:rPr>
-              <a:t>tatement</a:t>
-            </a:r>
-            <a:r>
-              <a:rPr lang="pl-PL" sz="2400" dirty="0" smtClean="0">
-                <a:solidFill>
-                  <a:srgbClr val="0070C0"/>
-                </a:solidFill>
-              </a:rPr>
-              <a:t> </a:t>
+              <a:t>Statement</a:t>
             </a:r>
             <a:r>
               <a:rPr lang="pl-PL" sz="2400" dirty="0">
@@ -7022,7 +6744,7 @@
                   <a:srgbClr val="0070C0"/>
                 </a:solidFill>
               </a:rPr>
-              <a:t>to your papers and list all the public </a:t>
+              <a:t> to your papers and list all the public </a:t>
             </a:r>
             <a:r>
               <a:rPr lang="en-GB" sz="2400" dirty="0">
@@ -7033,18 +6755,13 @@
               <a:t>r</a:t>
             </a:r>
             <a:r>
-              <a:rPr lang="pl-PL" sz="2400" dirty="0" smtClean="0">
+              <a:rPr lang="pl-PL" sz="2400" dirty="0">
                 <a:solidFill>
                   <a:srgbClr val="0070C0"/>
                 </a:solidFill>
               </a:rPr>
               <a:t>ecords</a:t>
             </a:r>
-            <a:endParaRPr lang="pl-PL" sz="2400" dirty="0">
-              <a:solidFill>
-                <a:srgbClr val="0070C0"/>
-              </a:solidFill>
-            </a:endParaRPr>
           </a:p>
           <a:p>
             <a:pPr marL="285750" indent="-285750">
@@ -7060,15 +6777,15 @@
                   <a:srgbClr val="0070C0"/>
                 </a:solidFill>
               </a:rPr>
-              <a:t>List </a:t>
-            </a:r>
-            <a:r>
-              <a:rPr lang="pl-PL" sz="2400" dirty="0" smtClean="0">
-                <a:solidFill>
-                  <a:srgbClr val="0070C0"/>
-                </a:solidFill>
-              </a:rPr>
-              <a:t>data </a:t>
+              <a:t>List data sets in </a:t>
+            </a:r>
+            <a:r>
+              <a:rPr lang="en-GB" sz="2400" dirty="0">
+                <a:solidFill>
+                  <a:srgbClr val="0070C0"/>
+                </a:solidFill>
+              </a:rPr>
+              <a:t>your </a:t>
             </a:r>
             <a:r>
               <a:rPr lang="pl-PL" sz="2400" dirty="0">
@@ -7076,37 +6793,16 @@
                   <a:srgbClr val="0070C0"/>
                 </a:solidFill>
               </a:rPr>
-              <a:t>sets in </a:t>
-            </a:r>
-            <a:r>
-              <a:rPr lang="en-GB" sz="2400" dirty="0" smtClean="0">
-                <a:solidFill>
-                  <a:srgbClr val="0070C0"/>
-                </a:solidFill>
-              </a:rPr>
-              <a:t>your </a:t>
-            </a:r>
-            <a:r>
-              <a:rPr lang="pl-PL" sz="2400" dirty="0" smtClean="0">
-                <a:solidFill>
-                  <a:srgbClr val="0070C0"/>
-                </a:solidFill>
-              </a:rPr>
               <a:t>ORCID</a:t>
             </a:r>
             <a:r>
-              <a:rPr lang="en-GB" sz="2400" dirty="0" smtClean="0">
+              <a:rPr lang="en-GB" sz="2400" dirty="0">
                 <a:solidFill>
                   <a:srgbClr val="0070C0"/>
                 </a:solidFill>
               </a:rPr>
               <a:t> record</a:t>
             </a:r>
-            <a:endParaRPr lang="en-GB" sz="2400" dirty="0">
-              <a:solidFill>
-                <a:srgbClr val="0070C0"/>
-              </a:solidFill>
-            </a:endParaRPr>
           </a:p>
         </p:txBody>
       </p:sp>
@@ -7239,13 +6935,6 @@
   <p:clrMapOvr>
     <a:masterClrMapping/>
   </p:clrMapOvr>
-  <p:timing>
-    <p:tnLst>
-      <p:par>
-        <p:cTn id="1" dur="indefinite" restart="never" nodeType="tmRoot"/>
-      </p:par>
-    </p:tnLst>
-  </p:timing>
 </p:sld>
 </file>
 
@@ -7300,21 +6989,8 @@
                   <a:srgbClr val="0070C0"/>
                 </a:solidFill>
               </a:rPr>
-              <a:t>Find suitable repository(ies) as soon as </a:t>
-            </a:r>
-            <a:r>
-              <a:rPr lang="en-GB" sz="2400" dirty="0" smtClean="0">
-                <a:solidFill>
-                  <a:srgbClr val="0070C0"/>
-                </a:solidFill>
-              </a:rPr>
-              <a:t>data are generated</a:t>
-            </a:r>
-            <a:endParaRPr lang="en-GB" sz="2400" dirty="0">
-              <a:solidFill>
-                <a:srgbClr val="0070C0"/>
-              </a:solidFill>
-            </a:endParaRPr>
+              <a:t>Find suitable repository(ies) as soon as data are generated</a:t>
+            </a:r>
           </a:p>
           <a:p>
             <a:pPr marL="285750" indent="-285750">
@@ -7325,7 +7001,7 @@
               <a:buChar char="•"/>
             </a:pPr>
             <a:r>
-              <a:rPr lang="en-GB" sz="2400" smtClean="0">
+              <a:rPr lang="en-GB" sz="2400">
                 <a:solidFill>
                   <a:srgbClr val="0070C0"/>
                 </a:solidFill>
@@ -7346,39 +7022,7 @@
                   <a:srgbClr val="0070C0"/>
                 </a:solidFill>
               </a:rPr>
-              <a:t>permits </a:t>
-            </a:r>
-            <a:r>
-              <a:rPr lang="en-GB" sz="2400" smtClean="0">
-                <a:solidFill>
-                  <a:srgbClr val="0070C0"/>
-                </a:solidFill>
-              </a:rPr>
-              <a:t>embargo, </a:t>
-            </a:r>
-            <a:r>
-              <a:rPr lang="en-GB" sz="2400">
-                <a:solidFill>
-                  <a:srgbClr val="0070C0"/>
-                </a:solidFill>
-              </a:rPr>
-              <a:t>deposit </a:t>
-            </a:r>
-            <a:r>
-              <a:rPr lang="en-GB" sz="2400" smtClean="0">
-                <a:solidFill>
-                  <a:srgbClr val="0070C0"/>
-                </a:solidFill>
-              </a:rPr>
-              <a:t>your data </a:t>
-            </a:r>
-            <a:r>
-              <a:rPr lang="en-GB" sz="2400" dirty="0" smtClean="0">
-                <a:solidFill>
-                  <a:srgbClr val="0070C0"/>
-                </a:solidFill>
-              </a:rPr>
-              <a:t>as </a:t>
+              <a:t>permits embargo, deposit your data </a:t>
             </a:r>
             <a:r>
               <a:rPr lang="en-GB" sz="2400" dirty="0">
@@ -7386,49 +7030,25 @@
                   <a:srgbClr val="0070C0"/>
                 </a:solidFill>
               </a:rPr>
-              <a:t>soon as </a:t>
-            </a:r>
-            <a:r>
-              <a:rPr lang="en-GB" sz="2400" dirty="0" smtClean="0">
-                <a:solidFill>
-                  <a:srgbClr val="0070C0"/>
-                </a:solidFill>
-              </a:rPr>
-              <a:t>they are obtained </a:t>
+              <a:t>as soon as they are obtained </a:t>
             </a:r>
             <a:br>
-              <a:rPr lang="en-GB" sz="2400" dirty="0" smtClean="0">
+              <a:rPr lang="en-GB" sz="2400" dirty="0">
                 <a:solidFill>
                   <a:srgbClr val="0070C0"/>
                 </a:solidFill>
               </a:rPr>
             </a:br>
             <a:r>
-              <a:rPr lang="en-GB" sz="2400" dirty="0" smtClean="0">
-                <a:solidFill>
-                  <a:srgbClr val="0070C0"/>
-                </a:solidFill>
-              </a:rPr>
-              <a:t>(</a:t>
-            </a:r>
-            <a:r>
               <a:rPr lang="en-GB" sz="2400" dirty="0">
                 <a:solidFill>
                   <a:srgbClr val="0070C0"/>
                 </a:solidFill>
               </a:rPr>
-              <a:t>especially if analysed </a:t>
-            </a:r>
-            <a:r>
-              <a:rPr lang="en-GB" sz="2400" dirty="0" smtClean="0">
-                <a:solidFill>
-                  <a:srgbClr val="0070C0"/>
-                </a:solidFill>
-              </a:rPr>
-              <a:t>by 3</a:t>
-            </a:r>
-            <a:r>
-              <a:rPr lang="en-GB" sz="2400" baseline="30000" dirty="0" smtClean="0">
+              <a:t>(especially if analysed by 3</a:t>
+            </a:r>
+            <a:r>
+              <a:rPr lang="en-GB" sz="2400" baseline="30000" dirty="0">
                 <a:solidFill>
                   <a:srgbClr val="0070C0"/>
                 </a:solidFill>
@@ -7436,7 +7056,7 @@
               <a:t>rd</a:t>
             </a:r>
             <a:r>
-              <a:rPr lang="en-GB" sz="2400" dirty="0" smtClean="0">
+              <a:rPr lang="en-GB" sz="2400" dirty="0">
                 <a:solidFill>
                   <a:srgbClr val="0070C0"/>
                 </a:solidFill>
@@ -7471,15 +7091,7 @@
                   <a:srgbClr val="0070C0"/>
                 </a:solidFill>
               </a:rPr>
-              <a:t>a </a:t>
-            </a:r>
-            <a:r>
-              <a:rPr lang="en-GB" sz="2400" smtClean="0">
-                <a:solidFill>
-                  <a:srgbClr val="0070C0"/>
-                </a:solidFill>
-              </a:rPr>
-              <a:t>'mainstream</a:t>
+              <a:t>a 'mainstream</a:t>
             </a:r>
             <a:r>
               <a:rPr lang="en-GB" sz="2400" dirty="0">
@@ -7490,20 +7102,12 @@
               <a:t>'</a:t>
             </a:r>
             <a:r>
-              <a:rPr lang="en-GB" sz="2400" smtClean="0">
-                <a:solidFill>
-                  <a:srgbClr val="0070C0"/>
-                </a:solidFill>
-              </a:rPr>
-              <a:t> </a:t>
-            </a:r>
-            <a:r>
               <a:rPr lang="en-GB" sz="2400">
                 <a:solidFill>
                   <a:srgbClr val="0070C0"/>
                 </a:solidFill>
               </a:rPr>
-              <a:t>one</a:t>
+              <a:t> one</a:t>
             </a:r>
             <a:r>
               <a:rPr lang="pl-PL" sz="2400">
@@ -7511,18 +7115,10 @@
                   <a:srgbClr val="0070C0"/>
                 </a:solidFill>
               </a:rPr>
-              <a:t> </a:t>
-            </a:r>
-            <a:r>
-              <a:rPr lang="pl-PL" sz="2400" smtClean="0">
-                <a:solidFill>
-                  <a:srgbClr val="0070C0"/>
-                </a:solidFill>
-              </a:rPr>
-              <a:t>(</a:t>
-            </a:r>
-            <a:r>
-              <a:rPr lang="en-GB" sz="2400" smtClean="0">
+              <a:t> (</a:t>
+            </a:r>
+            <a:r>
+              <a:rPr lang="en-GB" sz="2400">
                 <a:solidFill>
                   <a:srgbClr val="0070C0"/>
                 </a:solidFill>
@@ -7530,7 +7126,7 @@
               <a:t>for </a:t>
             </a:r>
             <a:r>
-              <a:rPr lang="pl-PL" sz="2400" smtClean="0">
+              <a:rPr lang="pl-PL" sz="2400">
                 <a:solidFill>
                   <a:srgbClr val="0070C0"/>
                 </a:solidFill>
@@ -7538,7 +7134,7 @@
               <a:t>better </a:t>
             </a:r>
             <a:r>
-              <a:rPr lang="en-GB" sz="2400" smtClean="0">
+              <a:rPr lang="en-GB" sz="2400">
                 <a:solidFill>
                   <a:srgbClr val="0070C0"/>
                 </a:solidFill>
@@ -7546,7 +7142,7 @@
               <a:t>findability</a:t>
             </a:r>
             <a:r>
-              <a:rPr lang="pl-PL" sz="2400" smtClean="0">
+              <a:rPr lang="pl-PL" sz="2400">
                 <a:solidFill>
                   <a:srgbClr val="0070C0"/>
                 </a:solidFill>
@@ -7573,23 +7169,7 @@
                   <a:srgbClr val="0070C0"/>
                 </a:solidFill>
               </a:rPr>
-              <a:t>Cross link </a:t>
-            </a:r>
-            <a:r>
-              <a:rPr lang="en-GB" sz="2400" dirty="0" smtClean="0">
-                <a:solidFill>
-                  <a:srgbClr val="0070C0"/>
-                </a:solidFill>
-              </a:rPr>
-              <a:t>repositories</a:t>
-            </a:r>
-            <a:r>
-              <a:rPr lang="en-GB" sz="2400" dirty="0">
-                <a:solidFill>
-                  <a:srgbClr val="0070C0"/>
-                </a:solidFill>
-              </a:rPr>
-              <a:t>’ records </a:t>
+              <a:t>Cross link repositories’ records </a:t>
             </a:r>
             <a:endParaRPr lang="pl-PL" sz="2400" dirty="0">
               <a:solidFill>
@@ -7685,8 +7265,8 @@
         </p:nvSpPr>
         <p:spPr>
           <a:xfrm>
-            <a:off x="948099" y="1355649"/>
-            <a:ext cx="8837169" cy="5478423"/>
+            <a:off x="683694" y="1176459"/>
+            <a:ext cx="8837169" cy="4832092"/>
           </a:xfrm>
           <a:prstGeom prst="rect">
             <a:avLst/>
@@ -7705,91 +7285,41 @@
                   <a:srgbClr val="0070C0"/>
                 </a:solidFill>
               </a:rPr>
-              <a:t>Research data repositories are online repositories that enable the preservation, curation and publication of research ‘</a:t>
-            </a:r>
-            <a:r>
-              <a:rPr lang="en-GB" sz="2800">
-                <a:solidFill>
-                  <a:srgbClr val="0070C0"/>
-                </a:solidFill>
-              </a:rPr>
-              <a:t>products</a:t>
-            </a:r>
-            <a:r>
-              <a:rPr lang="en-GB" sz="2800" smtClean="0">
-                <a:solidFill>
-                  <a:srgbClr val="0070C0"/>
-                </a:solidFill>
-              </a:rPr>
-              <a:t>’:</a:t>
+              <a:t>Research data repositories are online </a:t>
+            </a:r>
+            <a:r>
+              <a:rPr lang="en-GB" sz="2800" dirty="0" smtClean="0">
+                <a:solidFill>
+                  <a:srgbClr val="0070C0"/>
+                </a:solidFill>
+              </a:rPr>
+              <a:t>databases </a:t>
+            </a:r>
+            <a:r>
+              <a:rPr lang="en-GB" sz="2800" dirty="0">
+                <a:solidFill>
+                  <a:srgbClr val="0070C0"/>
+                </a:solidFill>
+              </a:rPr>
+              <a:t>that enable the preservation, curation and publication of research ‘products’:</a:t>
             </a:r>
           </a:p>
           <a:p>
             <a:pPr marL="457200" indent="-457200">
               <a:lnSpc>
-                <a:spcPct val="250000"/>
+                <a:spcPct val="200000"/>
               </a:lnSpc>
               <a:buFont typeface="Arial" panose="020B0604020202020204" pitchFamily="34" charset="0"/>
               <a:buChar char="•"/>
             </a:pPr>
             <a:r>
-              <a:rPr lang="pl-PL" sz="2800" smtClean="0">
+              <a:rPr lang="pl-PL" sz="2800" dirty="0">
                 <a:solidFill>
                   <a:srgbClr val="0070C0"/>
                 </a:solidFill>
               </a:rPr>
               <a:t>data</a:t>
             </a:r>
-            <a:endParaRPr lang="en-GB" sz="2800" smtClean="0">
-              <a:solidFill>
-                <a:srgbClr val="0070C0"/>
-              </a:solidFill>
-            </a:endParaRPr>
-          </a:p>
-          <a:p>
-            <a:pPr marL="457200" indent="-457200">
-              <a:lnSpc>
-                <a:spcPct val="250000"/>
-              </a:lnSpc>
-              <a:buFont typeface="Arial" panose="020B0604020202020204" pitchFamily="34" charset="0"/>
-              <a:buChar char="•"/>
-            </a:pPr>
-            <a:r>
-              <a:rPr lang="pl-PL" sz="2800" smtClean="0">
-                <a:solidFill>
-                  <a:srgbClr val="0070C0"/>
-                </a:solidFill>
-              </a:rPr>
-              <a:t>code</a:t>
-            </a:r>
-          </a:p>
-          <a:p>
-            <a:pPr marL="457200" indent="-457200">
-              <a:lnSpc>
-                <a:spcPct val="250000"/>
-              </a:lnSpc>
-              <a:buFont typeface="Arial" panose="020B0604020202020204" pitchFamily="34" charset="0"/>
-              <a:buChar char="•"/>
-            </a:pPr>
-            <a:r>
-              <a:rPr lang="pl-PL" sz="2800" smtClean="0">
-                <a:solidFill>
-                  <a:srgbClr val="0070C0"/>
-                </a:solidFill>
-              </a:rPr>
-              <a:t>protocols</a:t>
-            </a:r>
-            <a:endParaRPr lang="en-GB" sz="2800" smtClean="0">
-              <a:solidFill>
-                <a:srgbClr val="0070C0"/>
-              </a:solidFill>
-            </a:endParaRPr>
-          </a:p>
-          <a:p>
-            <a:pPr marL="457200" indent="-457200">
-              <a:buFont typeface="Arial" panose="020B0604020202020204" pitchFamily="34" charset="0"/>
-              <a:buChar char="•"/>
-            </a:pPr>
             <a:endParaRPr lang="en-GB" sz="2800" dirty="0">
               <a:solidFill>
                 <a:srgbClr val="0070C0"/>
@@ -7797,6 +7327,63 @@
             </a:endParaRPr>
           </a:p>
           <a:p>
+            <a:pPr marL="457200" indent="-457200">
+              <a:lnSpc>
+                <a:spcPct val="200000"/>
+              </a:lnSpc>
+              <a:buFont typeface="Arial" panose="020B0604020202020204" pitchFamily="34" charset="0"/>
+              <a:buChar char="•"/>
+            </a:pPr>
+            <a:r>
+              <a:rPr lang="pl-PL" sz="2800" dirty="0">
+                <a:solidFill>
+                  <a:srgbClr val="0070C0"/>
+                </a:solidFill>
+              </a:rPr>
+              <a:t>code</a:t>
+            </a:r>
+          </a:p>
+          <a:p>
+            <a:pPr marL="457200" indent="-457200">
+              <a:lnSpc>
+                <a:spcPct val="200000"/>
+              </a:lnSpc>
+              <a:buFont typeface="Arial" panose="020B0604020202020204" pitchFamily="34" charset="0"/>
+              <a:buChar char="•"/>
+            </a:pPr>
+            <a:r>
+              <a:rPr lang="en-GB" sz="2800" dirty="0" smtClean="0">
+                <a:solidFill>
+                  <a:srgbClr val="0070C0"/>
+                </a:solidFill>
+              </a:rPr>
+              <a:t>p</a:t>
+            </a:r>
+            <a:r>
+              <a:rPr lang="pl-PL" sz="2800" dirty="0" smtClean="0">
+                <a:solidFill>
+                  <a:srgbClr val="0070C0"/>
+                </a:solidFill>
+              </a:rPr>
+              <a:t>rotocols</a:t>
+            </a:r>
+          </a:p>
+          <a:p>
+            <a:pPr marL="457200" indent="-457200">
+              <a:lnSpc>
+                <a:spcPct val="200000"/>
+              </a:lnSpc>
+              <a:buFont typeface="Arial" panose="020B0604020202020204" pitchFamily="34" charset="0"/>
+              <a:buChar char="•"/>
+            </a:pPr>
+            <a:r>
+              <a:rPr lang="en-GB" sz="2800" dirty="0" smtClean="0">
+                <a:solidFill>
+                  <a:srgbClr val="0070C0"/>
+                </a:solidFill>
+              </a:rPr>
+              <a:t>description of biological materials</a:t>
+            </a:r>
             <a:endParaRPr lang="en-GB" sz="2800" dirty="0">
               <a:solidFill>
                 <a:srgbClr val="0070C0"/>
@@ -7826,7 +7413,7 @@
                 <a14:useLocalDpi xmlns:a14="http://schemas.microsoft.com/office/drawing/2010/main" val="0"/>
               </a:ext>
               <a:ext uri="{96DAC541-7B7A-43D3-8B79-37D633B846F1}">
-                <asvg:svgBlip xmlns:asvg="http://schemas.microsoft.com/office/drawing/2016/SVG/main" xmlns="" r:embed="rId3"/>
+                <asvg:svgBlip xmlns="" xmlns:asvg="http://schemas.microsoft.com/office/drawing/2016/SVG/main" r:embed="rId3"/>
               </a:ext>
             </a:extLst>
           </a:blip>
@@ -7836,7 +7423,7 @@
         </p:blipFill>
         <p:spPr>
           <a:xfrm>
-            <a:off x="2847538" y="2575764"/>
+            <a:off x="3037140" y="2318806"/>
             <a:ext cx="1273699" cy="1273699"/>
           </a:xfrm>
           <a:prstGeom prst="rect">
@@ -7865,7 +7452,7 @@
                 <a14:useLocalDpi xmlns:a14="http://schemas.microsoft.com/office/drawing/2010/main" val="0"/>
               </a:ext>
               <a:ext uri="{96DAC541-7B7A-43D3-8B79-37D633B846F1}">
-                <asvg:svgBlip xmlns:asvg="http://schemas.microsoft.com/office/drawing/2016/SVG/main" xmlns="" r:embed="rId5"/>
+                <asvg:svgBlip xmlns="" xmlns:asvg="http://schemas.microsoft.com/office/drawing/2016/SVG/main" r:embed="rId5"/>
               </a:ext>
             </a:extLst>
           </a:blip>
@@ -7875,7 +7462,7 @@
         </p:blipFill>
         <p:spPr>
           <a:xfrm>
-            <a:off x="2662408" y="3668683"/>
+            <a:off x="4550941" y="2955655"/>
             <a:ext cx="1527248" cy="1527248"/>
           </a:xfrm>
           <a:prstGeom prst="rect">
@@ -7904,7 +7491,7 @@
                 <a14:useLocalDpi xmlns:a14="http://schemas.microsoft.com/office/drawing/2010/main" val="0"/>
               </a:ext>
               <a:ext uri="{96DAC541-7B7A-43D3-8B79-37D633B846F1}">
-                <asvg:svgBlip xmlns:asvg="http://schemas.microsoft.com/office/drawing/2016/SVG/main" xmlns="" r:embed="rId7"/>
+                <asvg:svgBlip xmlns="" xmlns:asvg="http://schemas.microsoft.com/office/drawing/2016/SVG/main" r:embed="rId7"/>
               </a:ext>
             </a:extLst>
           </a:blip>
@@ -7914,8 +7501,38 @@
         </p:blipFill>
         <p:spPr>
           <a:xfrm>
-            <a:off x="2739685" y="5151998"/>
+            <a:off x="3344079" y="4054627"/>
             <a:ext cx="1287440" cy="1287440"/>
+          </a:xfrm>
+          <a:prstGeom prst="rect">
+            <a:avLst/>
+          </a:prstGeom>
+        </p:spPr>
+      </p:pic>
+      <p:pic>
+        <p:nvPicPr>
+          <p:cNvPr id="2" name="Picture 1"/>
+          <p:cNvPicPr>
+            <a:picLocks noChangeAspect="1"/>
+          </p:cNvPicPr>
+          <p:nvPr/>
+        </p:nvPicPr>
+        <p:blipFill>
+          <a:blip r:embed="rId8">
+            <a:extLst>
+              <a:ext uri="{28A0092B-C50C-407E-A947-70E740481C1C}">
+                <a14:useLocalDpi xmlns:a14="http://schemas.microsoft.com/office/drawing/2010/main" val="0"/>
+              </a:ext>
+            </a:extLst>
+          </a:blip>
+          <a:stretch>
+            <a:fillRect/>
+          </a:stretch>
+        </p:blipFill>
+        <p:spPr>
+          <a:xfrm>
+            <a:off x="6236656" y="4482903"/>
+            <a:ext cx="1562870" cy="1562870"/>
           </a:xfrm>
           <a:prstGeom prst="rect">
             <a:avLst/>
@@ -8110,14 +7727,14 @@
         <p:spPr>
           <a:xfrm>
             <a:off x="838201" y="1774196"/>
-            <a:ext cx="10388096" cy="3785652"/>
+            <a:ext cx="10388096" cy="4708981"/>
           </a:xfrm>
           <a:prstGeom prst="rect">
             <a:avLst/>
           </a:prstGeom>
         </p:spPr>
         <p:txBody>
-          <a:bodyPr wrap="square">
+          <a:bodyPr wrap="square" lIns="91440" tIns="45720" rIns="91440" bIns="45720" anchor="t">
             <a:spAutoFit/>
           </a:bodyPr>
           <a:lstStyle/>
@@ -8130,28 +7747,12 @@
               <a:buChar char="•"/>
             </a:pPr>
             <a:r>
-              <a:rPr lang="en-GB" sz="2400" smtClean="0">
-                <a:solidFill>
-                  <a:srgbClr val="0070C0"/>
-                </a:solidFill>
-              </a:rPr>
-              <a:t>Dryad		https</a:t>
-            </a:r>
-            <a:r>
-              <a:rPr lang="en-GB" sz="2400">
-                <a:solidFill>
-                  <a:srgbClr val="0070C0"/>
-                </a:solidFill>
-              </a:rPr>
-              <a:t>://</a:t>
-            </a:r>
-            <a:r>
-              <a:rPr lang="en-GB" sz="2400" smtClean="0">
-                <a:solidFill>
-                  <a:srgbClr val="0070C0"/>
-                </a:solidFill>
-              </a:rPr>
-              <a:t>datadryad.org </a:t>
+              <a:rPr lang="en-GB" sz="2400" dirty="0">
+                <a:solidFill>
+                  <a:srgbClr val="0070C0"/>
+                </a:solidFill>
+              </a:rPr>
+              <a:t>Dryad		https://datadryad.org </a:t>
             </a:r>
             <a:endParaRPr lang="pl-PL" sz="2400" dirty="0">
               <a:solidFill>
@@ -8168,28 +7769,20 @@
               <a:buChar char="•"/>
             </a:pPr>
             <a:r>
-              <a:rPr lang="en-GB" sz="2400" smtClean="0">
-                <a:solidFill>
-                  <a:srgbClr val="0070C0"/>
-                </a:solidFill>
-              </a:rPr>
-              <a:t>Zenodo		https</a:t>
-            </a:r>
-            <a:r>
-              <a:rPr lang="en-GB" sz="2400">
-                <a:solidFill>
-                  <a:srgbClr val="0070C0"/>
-                </a:solidFill>
-              </a:rPr>
-              <a:t>://</a:t>
-            </a:r>
-            <a:r>
-              <a:rPr lang="en-GB" sz="2400" smtClean="0">
-                <a:solidFill>
-                  <a:srgbClr val="0070C0"/>
-                </a:solidFill>
-              </a:rPr>
-              <a:t>zenodo.org </a:t>
+              <a:rPr lang="en-GB" sz="2400" dirty="0" err="1">
+                <a:solidFill>
+                  <a:srgbClr val="0070C0"/>
+                </a:solidFill>
+              </a:rPr>
+              <a:t>Zenodo</a:t>
+            </a:r>
+            <a:r>
+              <a:rPr lang="en-GB" sz="2400" dirty="0">
+                <a:solidFill>
+                  <a:srgbClr val="0070C0"/>
+                </a:solidFill>
+              </a:rPr>
+              <a:t>		https://zenodo.org </a:t>
             </a:r>
             <a:endParaRPr lang="pl-PL" sz="2400" dirty="0">
               <a:solidFill>
@@ -8206,28 +7799,20 @@
               <a:buChar char="•"/>
             </a:pPr>
             <a:r>
-              <a:rPr lang="en-GB" sz="2400" smtClean="0">
-                <a:solidFill>
-                  <a:srgbClr val="0070C0"/>
-                </a:solidFill>
-              </a:rPr>
-              <a:t>FigShare		https</a:t>
-            </a:r>
-            <a:r>
-              <a:rPr lang="en-GB" sz="2400">
-                <a:solidFill>
-                  <a:srgbClr val="0070C0"/>
-                </a:solidFill>
-              </a:rPr>
-              <a:t>://</a:t>
-            </a:r>
-            <a:r>
-              <a:rPr lang="en-GB" sz="2400" smtClean="0">
-                <a:solidFill>
-                  <a:srgbClr val="0070C0"/>
-                </a:solidFill>
-              </a:rPr>
-              <a:t>figshare.com </a:t>
+              <a:rPr lang="en-GB" sz="2400" dirty="0" err="1">
+                <a:solidFill>
+                  <a:srgbClr val="0070C0"/>
+                </a:solidFill>
+              </a:rPr>
+              <a:t>FigShare</a:t>
+            </a:r>
+            <a:r>
+              <a:rPr lang="en-GB" sz="2400" dirty="0">
+                <a:solidFill>
+                  <a:srgbClr val="0070C0"/>
+                </a:solidFill>
+              </a:rPr>
+              <a:t>		https://figshare.com </a:t>
             </a:r>
             <a:endParaRPr lang="pl-PL" sz="2400" dirty="0">
               <a:solidFill>
@@ -8244,28 +7829,75 @@
               <a:buChar char="•"/>
             </a:pPr>
             <a:r>
-              <a:rPr lang="en-GB" sz="2400" smtClean="0">
-                <a:solidFill>
-                  <a:srgbClr val="0070C0"/>
-                </a:solidFill>
-              </a:rPr>
-              <a:t>Harvard Dataverse	</a:t>
-            </a:r>
-            <a:r>
-              <a:rPr lang="en-GB" sz="2400">
-                <a:solidFill>
-                  <a:srgbClr val="0070C0"/>
-                </a:solidFill>
-              </a:rPr>
-              <a:t>https://</a:t>
-            </a:r>
-            <a:r>
-              <a:rPr lang="en-GB" sz="2400" smtClean="0">
-                <a:solidFill>
-                  <a:srgbClr val="0070C0"/>
-                </a:solidFill>
-              </a:rPr>
-              <a:t>dataverse.harvard.edu</a:t>
+              <a:rPr lang="en-GB" sz="2400" dirty="0">
+                <a:solidFill>
+                  <a:srgbClr val="0070C0"/>
+                </a:solidFill>
+              </a:rPr>
+              <a:t>Harvard </a:t>
+            </a:r>
+            <a:r>
+              <a:rPr lang="en-GB" sz="2400" dirty="0" err="1">
+                <a:solidFill>
+                  <a:srgbClr val="0070C0"/>
+                </a:solidFill>
+              </a:rPr>
+              <a:t>Dataverse</a:t>
+            </a:r>
+            <a:r>
+              <a:rPr lang="en-GB" sz="2400" dirty="0">
+                <a:solidFill>
+                  <a:srgbClr val="0070C0"/>
+                </a:solidFill>
+              </a:rPr>
+              <a:t>	</a:t>
+            </a:r>
+            <a:r>
+              <a:rPr lang="en-GB" sz="2400" dirty="0">
+                <a:solidFill>
+                  <a:srgbClr val="0070C0"/>
+                </a:solidFill>
+                <a:hlinkClick r:id="rId4"/>
+              </a:rPr>
+              <a:t>https://dataverse.harvard.edu</a:t>
+            </a:r>
+            <a:endParaRPr lang="en-GB" sz="2400" dirty="0">
+              <a:solidFill>
+                <a:srgbClr val="0070C0"/>
+              </a:solidFill>
+            </a:endParaRPr>
+          </a:p>
+          <a:p>
+            <a:pPr marL="285750" indent="-285750">
+              <a:lnSpc>
+                <a:spcPct val="250000"/>
+              </a:lnSpc>
+              <a:buFont typeface="Arial" panose="020B0604020202020204" pitchFamily="34" charset="0"/>
+              <a:buChar char="•"/>
+            </a:pPr>
+            <a:r>
+              <a:rPr lang="en-GB" sz="2400" dirty="0" smtClean="0">
+                <a:solidFill>
+                  <a:srgbClr val="0070C0"/>
+                </a:solidFill>
+              </a:rPr>
+              <a:t>and </a:t>
+            </a:r>
+            <a:r>
+              <a:rPr lang="en-GB" sz="2400" dirty="0">
+                <a:solidFill>
+                  <a:srgbClr val="0070C0"/>
+                </a:solidFill>
+              </a:rPr>
+              <a:t>your </a:t>
+            </a:r>
+            <a:r>
+              <a:rPr lang="en-GB" sz="2400" dirty="0" smtClean="0">
+                <a:solidFill>
+                  <a:srgbClr val="0070C0"/>
+                </a:solidFill>
+              </a:rPr>
+              <a:t>Institutional repository.</a:t>
             </a:r>
             <a:endParaRPr lang="pl-PL" sz="2400" dirty="0">
               <a:solidFill>
@@ -8318,7 +7950,7 @@
           <p:nvPr/>
         </p:nvPicPr>
         <p:blipFill>
-          <a:blip r:embed="rId4" cstate="hqprint">
+          <a:blip r:embed="rId5" cstate="hqprint">
             <a:extLst>
               <a:ext uri="{28A0092B-C50C-407E-A947-70E740481C1C}">
                 <a14:useLocalDpi xmlns:a14="http://schemas.microsoft.com/office/drawing/2010/main" val="0"/>
@@ -8365,7 +7997,7 @@
           <p:nvPr/>
         </p:nvPicPr>
         <p:blipFill>
-          <a:blip r:embed="rId5" cstate="hqprint">
+          <a:blip r:embed="rId6" cstate="hqprint">
             <a:extLst>
               <a:ext uri="{28A0092B-C50C-407E-A947-70E740481C1C}">
                 <a14:useLocalDpi xmlns:a14="http://schemas.microsoft.com/office/drawing/2010/main" val="0"/>
@@ -8412,7 +8044,7 @@
           <p:nvPr/>
         </p:nvPicPr>
         <p:blipFill>
-          <a:blip r:embed="rId6">
+          <a:blip r:embed="rId7">
             <a:extLst>
               <a:ext uri="{28A0092B-C50C-407E-A947-70E740481C1C}">
                 <a14:useLocalDpi xmlns:a14="http://schemas.microsoft.com/office/drawing/2010/main" val="0"/>
@@ -8459,7 +8091,7 @@
           <p:nvPr/>
         </p:nvPicPr>
         <p:blipFill>
-          <a:blip r:embed="rId7">
+          <a:blip r:embed="rId8">
             <a:extLst>
               <a:ext uri="{28A0092B-C50C-407E-A947-70E740481C1C}">
                 <a14:useLocalDpi xmlns:a14="http://schemas.microsoft.com/office/drawing/2010/main" val="0"/>
@@ -8624,18 +8256,13 @@
           <a:p>
             <a:pPr algn="ctr"/>
             <a:r>
-              <a:rPr lang="pl-PL" sz="4000" dirty="0" smtClean="0">
+              <a:rPr lang="pl-PL" sz="4000" dirty="0">
                 <a:solidFill>
                   <a:srgbClr val="0070C0"/>
                 </a:solidFill>
               </a:rPr>
               <a:t>What makes it FAIR</a:t>
             </a:r>
-            <a:endParaRPr lang="pl-PL" sz="4000" dirty="0">
-              <a:solidFill>
-                <a:srgbClr val="0070C0"/>
-              </a:solidFill>
-            </a:endParaRPr>
           </a:p>
           <a:p>
             <a:pPr marL="285750" indent="-285750" algn="ctr">
@@ -8799,18 +8426,13 @@
               <a:t> </a:t>
             </a:r>
             <a:r>
-              <a:rPr lang="pl-PL" sz="4000" dirty="0" smtClean="0">
+              <a:rPr lang="pl-PL" sz="4000" dirty="0">
                 <a:solidFill>
                   <a:srgbClr val="0070C0"/>
                 </a:solidFill>
               </a:rPr>
               <a:t>2</a:t>
             </a:r>
-            <a:endParaRPr lang="pl-PL" sz="4000" dirty="0">
-              <a:solidFill>
-                <a:srgbClr val="0070C0"/>
-              </a:solidFill>
-            </a:endParaRPr>
           </a:p>
           <a:p>
             <a:pPr marL="285750" indent="-285750" algn="ctr">
@@ -8906,47 +8528,27 @@
                 <a:effectLst/>
                 <a:latin typeface="Ubuntu"/>
               </a:rPr>
-              <a:t>from </a:t>
-            </a:r>
-            <a:r>
-              <a:rPr lang="en-GB" sz="2400" b="0" i="0" smtClean="0">
+              <a:t>from your paper</a:t>
+            </a:r>
+            <a:r>
+              <a:rPr lang="en-GB" sz="2400" b="0" i="0" dirty="0">
                 <a:solidFill>
                   <a:srgbClr val="333333"/>
                 </a:solidFill>
                 <a:effectLst/>
                 <a:latin typeface="Ubuntu"/>
               </a:rPr>
-              <a:t>your paper</a:t>
-            </a:r>
-            <a:r>
-              <a:rPr lang="en-GB" sz="2400" b="0" i="0" dirty="0">
+              <a:t>. It gives access to all files, allowing you to cite the data as well (or instead of) </a:t>
+            </a:r>
+            <a:r>
+              <a:rPr lang="en-GB" sz="2400" b="0" i="0">
                 <a:solidFill>
                   <a:srgbClr val="333333"/>
                 </a:solidFill>
                 <a:effectLst/>
                 <a:latin typeface="Ubuntu"/>
               </a:rPr>
-              <a:t>. It gives access to all files, allowing you to cite the data as well (or instead of) </a:t>
-            </a:r>
-            <a:r>
-              <a:rPr lang="en-GB" sz="2400" b="0" i="0">
-                <a:solidFill>
-                  <a:srgbClr val="333333"/>
-                </a:solidFill>
-                <a:effectLst/>
-                <a:latin typeface="Ubuntu"/>
-              </a:rPr>
-              <a:t>the </a:t>
-            </a:r>
-            <a:r>
-              <a:rPr lang="en-GB" sz="2400" b="0" i="0" smtClean="0">
-                <a:solidFill>
-                  <a:srgbClr val="333333"/>
-                </a:solidFill>
-                <a:effectLst/>
-                <a:latin typeface="Ubuntu"/>
-              </a:rPr>
-              <a:t>paper. </a:t>
+              <a:t>the paper. </a:t>
             </a:r>
           </a:p>
           <a:p>
@@ -8959,7 +8561,7 @@
           </a:p>
           <a:p>
             <a:r>
-              <a:rPr lang="en-GB" sz="2400" b="0" i="0" smtClean="0">
+              <a:rPr lang="en-GB" sz="2400" b="0" i="0">
                 <a:solidFill>
                   <a:srgbClr val="333333"/>
                 </a:solidFill>
@@ -8986,30 +8588,20 @@
                 <a:effectLst/>
                 <a:latin typeface="Ubuntu"/>
               </a:rPr>
-              <a:t>enforce </a:t>
-            </a:r>
-            <a:r>
-              <a:rPr lang="en-GB" sz="2400" b="0" i="0" smtClean="0">
+              <a:t>enforce metadata standards, except that a very few </a:t>
+            </a:r>
+            <a:r>
+              <a:rPr lang="pl-PL" sz="2400" b="0" i="0">
                 <a:solidFill>
                   <a:srgbClr val="333333"/>
                 </a:solidFill>
                 <a:effectLst/>
                 <a:latin typeface="Ubuntu"/>
               </a:rPr>
-              <a:t>metadata standards, except that a very few </a:t>
-            </a:r>
-            <a:r>
-              <a:rPr lang="pl-PL" sz="2400" b="0" i="0" smtClean="0">
-                <a:solidFill>
-                  <a:srgbClr val="333333"/>
-                </a:solidFill>
-                <a:effectLst/>
-                <a:latin typeface="Ubuntu"/>
-              </a:rPr>
               <a:t>m</a:t>
             </a:r>
             <a:r>
-              <a:rPr lang="en-GB" sz="2400" b="0" i="0" smtClean="0">
+              <a:rPr lang="en-GB" sz="2400" b="0" i="0">
                 <a:solidFill>
                   <a:srgbClr val="333333"/>
                 </a:solidFill>
@@ -9129,28 +8721,12 @@
               </a:tabLst>
             </a:pPr>
             <a:r>
-              <a:rPr lang="en-GB" sz="2400" smtClean="0">
-                <a:solidFill>
-                  <a:srgbClr val="0070C0"/>
-                </a:solidFill>
-              </a:rPr>
-              <a:t>UniProt	https</a:t>
-            </a:r>
-            <a:r>
-              <a:rPr lang="en-GB" sz="2400">
-                <a:solidFill>
-                  <a:srgbClr val="0070C0"/>
-                </a:solidFill>
-              </a:rPr>
-              <a:t>://</a:t>
-            </a:r>
-            <a:r>
-              <a:rPr lang="en-GB" sz="2400" smtClean="0">
-                <a:solidFill>
-                  <a:srgbClr val="0070C0"/>
-                </a:solidFill>
-              </a:rPr>
-              <a:t>www.uniprot.org </a:t>
+              <a:rPr lang="en-GB" sz="2400" dirty="0" err="1">
+                <a:solidFill>
+                  <a:srgbClr val="0070C0"/>
+                </a:solidFill>
+              </a:rPr>
+              <a:t>UniProt</a:t>
             </a:r>
             <a:r>
               <a:rPr lang="en-GB" sz="2400" dirty="0">
@@ -9158,7 +8734,7 @@
                   <a:srgbClr val="0070C0"/>
                 </a:solidFill>
               </a:rPr>
-              <a:t>– protein data</a:t>
+              <a:t>	https://www.uniprot.org – protein data</a:t>
             </a:r>
             <a:endParaRPr lang="pl-PL" sz="2400" dirty="0">
               <a:solidFill>
@@ -9178,28 +8754,12 @@
               </a:tabLst>
             </a:pPr>
             <a:r>
-              <a:rPr lang="en-GB" sz="2400" smtClean="0">
-                <a:solidFill>
-                  <a:srgbClr val="0070C0"/>
-                </a:solidFill>
-              </a:rPr>
-              <a:t>GenBank	https</a:t>
-            </a:r>
-            <a:r>
-              <a:rPr lang="en-GB" sz="2400">
-                <a:solidFill>
-                  <a:srgbClr val="0070C0"/>
-                </a:solidFill>
-              </a:rPr>
-              <a:t>://</a:t>
-            </a:r>
-            <a:r>
-              <a:rPr lang="en-GB" sz="2400" smtClean="0">
-                <a:solidFill>
-                  <a:srgbClr val="0070C0"/>
-                </a:solidFill>
-              </a:rPr>
-              <a:t>www.ncbi.nlm.nih.gov/genbank </a:t>
+              <a:rPr lang="en-GB" sz="2400" dirty="0" err="1">
+                <a:solidFill>
+                  <a:srgbClr val="0070C0"/>
+                </a:solidFill>
+              </a:rPr>
+              <a:t>GenBank</a:t>
             </a:r>
             <a:r>
               <a:rPr lang="en-GB" sz="2400" dirty="0">
@@ -9207,7 +8767,7 @@
                   <a:srgbClr val="0070C0"/>
                 </a:solidFill>
               </a:rPr>
-              <a:t>– sequence data</a:t>
+              <a:t>	https://www.ncbi.nlm.nih.gov/genbank – sequence data</a:t>
             </a:r>
             <a:endParaRPr lang="pl-PL" sz="2400" dirty="0">
               <a:solidFill>
@@ -9227,52 +8787,12 @@
               </a:tabLst>
             </a:pPr>
             <a:r>
-              <a:rPr lang="en-GB" sz="2400" smtClean="0">
-                <a:solidFill>
-                  <a:srgbClr val="0070C0"/>
-                </a:solidFill>
-              </a:rPr>
-              <a:t>GitHub	https</a:t>
-            </a:r>
-            <a:r>
-              <a:rPr lang="en-GB" sz="2400">
-                <a:solidFill>
-                  <a:srgbClr val="0070C0"/>
-                </a:solidFill>
-              </a:rPr>
-              <a:t>://</a:t>
-            </a:r>
-            <a:r>
-              <a:rPr lang="en-GB" sz="2400" smtClean="0">
-                <a:solidFill>
-                  <a:srgbClr val="0070C0"/>
-                </a:solidFill>
-              </a:rPr>
-              <a:t>github.com </a:t>
-            </a:r>
-            <a:r>
               <a:rPr lang="en-GB" sz="2400" dirty="0">
                 <a:solidFill>
                   <a:srgbClr val="0070C0"/>
                 </a:solidFill>
               </a:rPr>
-              <a:t>– </a:t>
-            </a:r>
-            <a:r>
-              <a:rPr lang="en-GB" sz="2400">
-                <a:solidFill>
-                  <a:srgbClr val="0070C0"/>
-                </a:solidFill>
-              </a:rPr>
-              <a:t>for </a:t>
-            </a:r>
-            <a:r>
-              <a:rPr lang="en-GB" sz="2400" smtClean="0">
-                <a:solidFill>
-                  <a:srgbClr val="0070C0"/>
-                </a:solidFill>
-              </a:rPr>
-              <a:t>code</a:t>
+              <a:t>GitHub	https://github.com – for code</a:t>
             </a:r>
           </a:p>
           <a:p>
@@ -9287,7 +8807,7 @@
               </a:tabLst>
             </a:pPr>
             <a:r>
-              <a:rPr lang="en-GB" sz="2400" smtClean="0">
+              <a:rPr lang="en-GB" sz="2400" dirty="0" err="1">
                 <a:solidFill>
                   <a:srgbClr val="0070C0"/>
                 </a:solidFill>
@@ -9295,14 +8815,14 @@
               <a:t>MetaboLights</a:t>
             </a:r>
             <a:r>
-              <a:rPr lang="en-GB" sz="2400">
+              <a:rPr lang="en-GB" sz="2400" dirty="0">
                 <a:solidFill>
                   <a:srgbClr val="0070C0"/>
                 </a:solidFill>
               </a:rPr>
               <a:t>	https://www.ebi.ac.uk/metabolights – metabolomics data</a:t>
             </a:r>
-            <a:endParaRPr lang="pl-PL" sz="2400">
+            <a:endParaRPr lang="pl-PL" sz="2400" dirty="0">
               <a:solidFill>
                 <a:srgbClr val="0070C0"/>
               </a:solidFill>
@@ -9349,12 +8869,8 @@
           <a:lstStyle/>
           <a:p>
             <a:r>
-              <a:rPr lang="en-GB" dirty="0" smtClean="0"/>
-              <a:t>“</a:t>
-            </a:r>
-            <a:r>
               <a:rPr lang="en-GB" dirty="0"/>
-              <a:t>domain” (type) specific repositories</a:t>
+              <a:t>“domain” (type) specific repositories</a:t>
             </a:r>
           </a:p>
         </p:txBody>

</xml_diff>